<commit_message>
wip on new poster
</commit_message>
<xml_diff>
--- a/MoLOverviewPoster2016.pptx
+++ b/MoLOverviewPoster2016.pptx
@@ -7,6 +7,9 @@
   <p:notesMasterIdLst>
     <p:notesMasterId r:id="rId3"/>
   </p:notesMasterIdLst>
+  <p:handoutMasterIdLst>
+    <p:handoutMasterId r:id="rId4"/>
+  </p:handoutMasterIdLst>
   <p:sldIdLst>
     <p:sldId id="257" r:id="rId2"/>
   </p:sldIdLst>
@@ -103,6 +106,171 @@
     </p:ext>
   </p:extLst>
 </p:presentation>
+</file>
+
+<file path=ppt/handoutMasters/handoutMaster1.xml><?xml version="1.0" encoding="utf-8"?>
+<p:handoutMaster xmlns:a="http://schemas.openxmlformats.org/drawingml/2006/main" xmlns:r="http://schemas.openxmlformats.org/officeDocument/2006/relationships" xmlns:p="http://schemas.openxmlformats.org/presentationml/2006/main">
+  <p:cSld>
+    <p:bg>
+      <p:bgRef idx="1001">
+        <a:schemeClr val="bg1"/>
+      </p:bgRef>
+    </p:bg>
+    <p:spTree>
+      <p:nvGrpSpPr>
+        <p:cNvPr id="1" name=""/>
+        <p:cNvGrpSpPr/>
+        <p:nvPr/>
+      </p:nvGrpSpPr>
+      <p:grpSpPr>
+        <a:xfrm>
+          <a:off x="0" y="0"/>
+          <a:ext cx="0" cy="0"/>
+          <a:chOff x="0" y="0"/>
+          <a:chExt cx="0" cy="0"/>
+        </a:xfrm>
+      </p:grpSpPr>
+      <p:sp>
+        <p:nvSpPr>
+          <p:cNvPr id="2" name="Header Placeholder 1"/>
+          <p:cNvSpPr>
+            <a:spLocks noGrp="1"/>
+          </p:cNvSpPr>
+          <p:nvPr>
+            <p:ph type="hdr" sz="quarter"/>
+          </p:nvPr>
+        </p:nvSpPr>
+        <p:spPr>
+          <a:xfrm>
+            <a:off x="0" y="0"/>
+            <a:ext cx="2881313" cy="490538"/>
+          </a:xfrm>
+          <a:prstGeom prst="rect">
+            <a:avLst/>
+          </a:prstGeom>
+        </p:spPr>
+        <p:txBody>
+          <a:bodyPr vert="horz" lIns="91440" tIns="45720" rIns="91440" bIns="45720" rtlCol="0"/>
+          <a:lstStyle>
+            <a:lvl1pPr algn="l">
+              <a:defRPr sz="1200"/>
+            </a:lvl1pPr>
+          </a:lstStyle>
+          <a:p>
+            <a:endParaRPr lang="en-US"/>
+          </a:p>
+        </p:txBody>
+      </p:sp>
+      <p:sp>
+        <p:nvSpPr>
+          <p:cNvPr id="3" name="Date Placeholder 2"/>
+          <p:cNvSpPr>
+            <a:spLocks noGrp="1"/>
+          </p:cNvSpPr>
+          <p:nvPr>
+            <p:ph type="dt" sz="quarter" idx="1"/>
+          </p:nvPr>
+        </p:nvSpPr>
+        <p:spPr>
+          <a:xfrm>
+            <a:off x="3765550" y="0"/>
+            <a:ext cx="2881313" cy="490538"/>
+          </a:xfrm>
+          <a:prstGeom prst="rect">
+            <a:avLst/>
+          </a:prstGeom>
+        </p:spPr>
+        <p:txBody>
+          <a:bodyPr vert="horz" lIns="91440" tIns="45720" rIns="91440" bIns="45720" rtlCol="0"/>
+          <a:lstStyle>
+            <a:lvl1pPr algn="r">
+              <a:defRPr sz="1200"/>
+            </a:lvl1pPr>
+          </a:lstStyle>
+          <a:p>
+            <a:fld id="{B179243D-0E3E-4D4F-90E9-F9F1DBB34143}" type="datetimeFigureOut">
+              <a:rPr lang="en-US" smtClean="0"/>
+              <a:t>7/13/16</a:t>
+            </a:fld>
+            <a:endParaRPr lang="en-US"/>
+          </a:p>
+        </p:txBody>
+      </p:sp>
+      <p:sp>
+        <p:nvSpPr>
+          <p:cNvPr id="4" name="Footer Placeholder 3"/>
+          <p:cNvSpPr>
+            <a:spLocks noGrp="1"/>
+          </p:cNvSpPr>
+          <p:nvPr>
+            <p:ph type="ftr" sz="quarter" idx="2"/>
+          </p:nvPr>
+        </p:nvSpPr>
+        <p:spPr>
+          <a:xfrm>
+            <a:off x="0" y="9283700"/>
+            <a:ext cx="2881313" cy="490538"/>
+          </a:xfrm>
+          <a:prstGeom prst="rect">
+            <a:avLst/>
+          </a:prstGeom>
+        </p:spPr>
+        <p:txBody>
+          <a:bodyPr vert="horz" lIns="91440" tIns="45720" rIns="91440" bIns="45720" rtlCol="0" anchor="b"/>
+          <a:lstStyle>
+            <a:lvl1pPr algn="l">
+              <a:defRPr sz="1200"/>
+            </a:lvl1pPr>
+          </a:lstStyle>
+          <a:p>
+            <a:endParaRPr lang="en-US"/>
+          </a:p>
+        </p:txBody>
+      </p:sp>
+      <p:sp>
+        <p:nvSpPr>
+          <p:cNvPr id="5" name="Slide Number Placeholder 4"/>
+          <p:cNvSpPr>
+            <a:spLocks noGrp="1"/>
+          </p:cNvSpPr>
+          <p:nvPr>
+            <p:ph type="sldNum" sz="quarter" idx="3"/>
+          </p:nvPr>
+        </p:nvSpPr>
+        <p:spPr>
+          <a:xfrm>
+            <a:off x="3765550" y="9283700"/>
+            <a:ext cx="2881313" cy="490538"/>
+          </a:xfrm>
+          <a:prstGeom prst="rect">
+            <a:avLst/>
+          </a:prstGeom>
+        </p:spPr>
+        <p:txBody>
+          <a:bodyPr vert="horz" lIns="91440" tIns="45720" rIns="91440" bIns="45720" rtlCol="0" anchor="b"/>
+          <a:lstStyle>
+            <a:lvl1pPr algn="r">
+              <a:defRPr sz="1200"/>
+            </a:lvl1pPr>
+          </a:lstStyle>
+          <a:p>
+            <a:fld id="{57F66809-BDDB-184B-A42F-900CB3A6749F}" type="slidenum">
+              <a:rPr lang="en-US" smtClean="0"/>
+              <a:t>‹#›</a:t>
+            </a:fld>
+            <a:endParaRPr lang="en-US"/>
+          </a:p>
+        </p:txBody>
+      </p:sp>
+    </p:spTree>
+    <p:extLst>
+      <p:ext uri="{BB962C8B-B14F-4D97-AF65-F5344CB8AC3E}">
+        <p14:creationId xmlns:p14="http://schemas.microsoft.com/office/powerpoint/2010/main" val="1375908621"/>
+      </p:ext>
+    </p:extLst>
+  </p:cSld>
+  <p:clrMap bg1="lt1" tx1="dk1" bg2="lt2" tx2="dk2" accent1="accent1" accent2="accent2" accent3="accent3" accent4="accent4" accent5="accent5" accent6="accent6" hlink="hlink" folHlink="folHlink"/>
+</p:handoutMaster>
 </file>
 
 <file path=ppt/notesMasters/notesMaster1.xml><?xml version="1.0" encoding="utf-8"?>
@@ -405,13 +573,21 @@
         </p:spPr>
         <p:txBody>
           <a:bodyPr/>
-          <a:lstStyle/>
+          <a:lstStyle>
+            <a:lvl1pPr>
+              <a:defRPr>
+                <a:latin typeface="Calibri" charset="0"/>
+                <a:ea typeface="Calibri" charset="0"/>
+                <a:cs typeface="Calibri" charset="0"/>
+              </a:defRPr>
+            </a:lvl1pPr>
+          </a:lstStyle>
           <a:p>
             <a:pPr lvl="0">
               <a:defRPr sz="1800"/>
             </a:pPr>
             <a:r>
-              <a:rPr sz="20200"/>
+              <a:rPr sz="20200" dirty="0"/>
               <a:t>Title Text</a:t>
             </a:r>
           </a:p>
@@ -499,7 +675,7 @@
               </a:defRPr>
             </a:pPr>
             <a:r>
-              <a:rPr sz="14700">
+              <a:rPr sz="14700" dirty="0">
                 <a:solidFill>
                   <a:srgbClr val="888888"/>
                 </a:solidFill>
@@ -516,7 +692,7 @@
               </a:defRPr>
             </a:pPr>
             <a:r>
-              <a:rPr sz="14700">
+              <a:rPr sz="14700" dirty="0">
                 <a:solidFill>
                   <a:srgbClr val="888888"/>
                 </a:solidFill>
@@ -533,7 +709,7 @@
               </a:defRPr>
             </a:pPr>
             <a:r>
-              <a:rPr sz="14700">
+              <a:rPr sz="14700" dirty="0">
                 <a:solidFill>
                   <a:srgbClr val="888888"/>
                 </a:solidFill>
@@ -550,7 +726,7 @@
               </a:defRPr>
             </a:pPr>
             <a:r>
-              <a:rPr sz="14700">
+              <a:rPr sz="14700" dirty="0">
                 <a:solidFill>
                   <a:srgbClr val="888888"/>
                 </a:solidFill>
@@ -567,7 +743,7 @@
               </a:defRPr>
             </a:pPr>
             <a:r>
-              <a:rPr sz="14700">
+              <a:rPr sz="14700" dirty="0">
                 <a:solidFill>
                   <a:srgbClr val="888888"/>
                 </a:solidFill>
@@ -600,7 +776,7 @@
             <a:fld id="{86CB4B4D-7CA3-9044-876B-883B54F8677D}" type="slidenum">
               <a:t>‹#›</a:t>
             </a:fld>
-            <a:endParaRPr/>
+            <a:endParaRPr dirty="0"/>
           </a:p>
         </p:txBody>
       </p:sp>
@@ -610,6 +786,13 @@
     <a:masterClrMapping/>
   </p:clrMapOvr>
   <p:transition spd="med"/>
+  <p:timing>
+    <p:tnLst>
+      <p:par>
+        <p:cTn id="1" dur="indefinite" restart="never" nodeType="tmRoot"/>
+      </p:par>
+    </p:tnLst>
+  </p:timing>
 </p:sldLayout>
 </file>
 
@@ -810,6 +993,91 @@
     <a:masterClrMapping/>
   </p:clrMapOvr>
   <p:transition spd="med"/>
+</p:sldLayout>
+</file>
+
+<file path=ppt/slideLayouts/slideLayout12.xml><?xml version="1.0" encoding="utf-8"?>
+<p:sldLayout xmlns:a="http://schemas.openxmlformats.org/drawingml/2006/main" xmlns:r="http://schemas.openxmlformats.org/officeDocument/2006/relationships" xmlns:p="http://schemas.openxmlformats.org/presentationml/2006/main" preserve="1" userDrawn="1">
+  <p:cSld name="Custom Layout">
+    <p:spTree>
+      <p:nvGrpSpPr>
+        <p:cNvPr id="1" name=""/>
+        <p:cNvGrpSpPr/>
+        <p:nvPr/>
+      </p:nvGrpSpPr>
+      <p:grpSpPr>
+        <a:xfrm>
+          <a:off x="0" y="0"/>
+          <a:ext cx="0" cy="0"/>
+          <a:chOff x="0" y="0"/>
+          <a:chExt cx="0" cy="0"/>
+        </a:xfrm>
+      </p:grpSpPr>
+      <p:sp>
+        <p:nvSpPr>
+          <p:cNvPr id="2" name="Title 1"/>
+          <p:cNvSpPr>
+            <a:spLocks noGrp="1"/>
+          </p:cNvSpPr>
+          <p:nvPr>
+            <p:ph type="title"/>
+          </p:nvPr>
+        </p:nvSpPr>
+        <p:spPr/>
+        <p:txBody>
+          <a:bodyPr/>
+          <a:lstStyle/>
+          <a:p>
+            <a:r>
+              <a:rPr lang="en-US" smtClean="0"/>
+              <a:t>Click to edit Master title style</a:t>
+            </a:r>
+            <a:endParaRPr lang="en-US"/>
+          </a:p>
+        </p:txBody>
+      </p:sp>
+      <p:sp>
+        <p:nvSpPr>
+          <p:cNvPr id="3" name="Slide Number Placeholder 2"/>
+          <p:cNvSpPr>
+            <a:spLocks noGrp="1"/>
+          </p:cNvSpPr>
+          <p:nvPr>
+            <p:ph type="sldNum" sz="quarter" idx="10"/>
+          </p:nvPr>
+        </p:nvSpPr>
+        <p:spPr/>
+        <p:txBody>
+          <a:bodyPr/>
+          <a:lstStyle/>
+          <a:p>
+            <a:pPr lvl="0"/>
+            <a:fld id="{86CB4B4D-7CA3-9044-876B-883B54F8677D}" type="slidenum">
+              <a:rPr lang="uk-UA" smtClean="0"/>
+              <a:t>‹#›</a:t>
+            </a:fld>
+            <a:endParaRPr lang="uk-UA"/>
+          </a:p>
+        </p:txBody>
+      </p:sp>
+    </p:spTree>
+    <p:extLst>
+      <p:ext uri="{BB962C8B-B14F-4D97-AF65-F5344CB8AC3E}">
+        <p14:creationId xmlns:p14="http://schemas.microsoft.com/office/powerpoint/2010/main" val="1489181157"/>
+      </p:ext>
+    </p:extLst>
+  </p:cSld>
+  <p:clrMapOvr>
+    <a:masterClrMapping/>
+  </p:clrMapOvr>
+  <p:transition spd="med"/>
+  <p:timing>
+    <p:tnLst>
+      <p:par>
+        <p:cTn id="1" dur="indefinite" restart="never" nodeType="tmRoot"/>
+      </p:par>
+    </p:tnLst>
+  </p:timing>
 </p:sldLayout>
 </file>
 
@@ -2221,8 +2489,16 @@
     <p:sldLayoutId id="2147483657" r:id="rId9"/>
     <p:sldLayoutId id="2147483658" r:id="rId10"/>
     <p:sldLayoutId id="2147483659" r:id="rId11"/>
+    <p:sldLayoutId id="2147483660" r:id="rId12"/>
   </p:sldLayoutIdLst>
   <p:transition spd="med"/>
+  <p:timing>
+    <p:tnLst>
+      <p:par>
+        <p:cTn id="1" dur="indefinite" restart="never" nodeType="tmRoot"/>
+      </p:par>
+    </p:tnLst>
+  </p:timing>
   <p:txStyles>
     <p:titleStyle>
       <a:lvl1pPr algn="ctr" defTabSz="2087574">
@@ -4292,7 +4568,7 @@
           <p:spPr>
             <a:xfrm>
               <a:off x="37382564" y="24452854"/>
-              <a:ext cx="3013179" cy="1659602"/>
+              <a:ext cx="3013179" cy="1792874"/>
             </a:xfrm>
             <a:prstGeom prst="roundRect">
               <a:avLst>
@@ -4368,35 +4644,22 @@
                 <a:gd name="adj" fmla="val 16667"/>
               </a:avLst>
             </a:prstGeom>
-            <a:gradFill flip="none" rotWithShape="1">
-              <a:gsLst>
-                <a:gs pos="0">
-                  <a:srgbClr val="FFD1BB"/>
-                </a:gs>
-                <a:gs pos="35000">
-                  <a:srgbClr val="FFDECF"/>
-                </a:gs>
-                <a:gs pos="100000">
-                  <a:srgbClr val="FFF2ED"/>
-                </a:gs>
-              </a:gsLst>
-              <a:lin ang="16200000" scaled="0"/>
-            </a:gradFill>
-            <a:ln w="9525" cap="flat">
-              <a:solidFill>
-                <a:srgbClr val="F69240"/>
-              </a:solidFill>
-              <a:prstDash val="solid"/>
-              <a:bevel/>
-            </a:ln>
-            <a:effectLst>
-              <a:outerShdw blurRad="38100" dist="20000" dir="5400000" rotWithShape="0">
-                <a:srgbClr val="000000">
-                  <a:alpha val="38000"/>
-                </a:srgbClr>
-              </a:outerShdw>
-            </a:effectLst>
+            <a:ln/>
           </p:spPr>
+          <p:style>
+            <a:lnRef idx="1">
+              <a:schemeClr val="accent4"/>
+            </a:lnRef>
+            <a:fillRef idx="2">
+              <a:schemeClr val="accent4"/>
+            </a:fillRef>
+            <a:effectRef idx="1">
+              <a:schemeClr val="accent4"/>
+            </a:effectRef>
+            <a:fontRef idx="minor">
+              <a:schemeClr val="dk1"/>
+            </a:fontRef>
+          </p:style>
           <p:txBody>
             <a:bodyPr wrap="square" lIns="0" tIns="0" rIns="0" bIns="0" numCol="1" anchor="ctr">
               <a:noAutofit/>
@@ -4407,17 +4670,97 @@
                 <a:defRPr sz="1800"/>
               </a:pPr>
               <a:r>
-                <a:rPr lang="en-US" sz="2900" dirty="0"/>
+                <a:rPr lang="en-US" sz="2900" dirty="0">
+                  <a:latin typeface="Calibri" charset="0"/>
+                  <a:ea typeface="Calibri" charset="0"/>
+                  <a:cs typeface="Calibri" charset="0"/>
+                </a:rPr>
                 <a:t>[</a:t>
               </a:r>
               <a:r>
-                <a:rPr lang="en-US" sz="2900" dirty="0" err="1"/>
+                <a:rPr lang="en-US" sz="2900" dirty="0" err="1">
+                  <a:latin typeface="Calibri" charset="0"/>
+                  <a:ea typeface="Calibri" charset="0"/>
+                  <a:cs typeface="Calibri" charset="0"/>
+                </a:rPr>
                 <a:t>MoL</a:t>
               </a:r>
               <a:r>
-                <a:rPr lang="en-US" sz="2900" dirty="0"/>
-                <a:t>-FNWI] Game Theory (TBD)</a:t>
-              </a:r>
+                <a:rPr lang="en-US" sz="2900" dirty="0">
+                  <a:latin typeface="Calibri" charset="0"/>
+                  <a:ea typeface="Calibri" charset="0"/>
+                  <a:cs typeface="Calibri" charset="0"/>
+                </a:rPr>
+                <a:t>-FNWI] </a:t>
+              </a:r>
+              <a:r>
+                <a:rPr lang="en-US" sz="2900" dirty="0" smtClean="0">
+                  <a:latin typeface="Calibri" charset="0"/>
+                  <a:ea typeface="Calibri" charset="0"/>
+                  <a:cs typeface="Calibri" charset="0"/>
+                </a:rPr>
+                <a:t/>
+              </a:r>
+              <a:br>
+                <a:rPr lang="en-US" sz="2900" dirty="0" smtClean="0">
+                  <a:latin typeface="Calibri" charset="0"/>
+                  <a:ea typeface="Calibri" charset="0"/>
+                  <a:cs typeface="Calibri" charset="0"/>
+                </a:rPr>
+              </a:br>
+              <a:r>
+                <a:rPr lang="en-US" sz="2900" dirty="0">
+                  <a:latin typeface="Calibri" charset="0"/>
+                  <a:ea typeface="Calibri" charset="0"/>
+                  <a:cs typeface="Calibri" charset="0"/>
+                </a:rPr>
+                <a:t>Game</a:t>
+              </a:r>
+              <a:r>
+                <a:rPr lang="en-US" sz="2900" dirty="0" smtClean="0">
+                  <a:latin typeface="Calibri" charset="0"/>
+                  <a:ea typeface="Calibri" charset="0"/>
+                  <a:cs typeface="Calibri" charset="0"/>
+                </a:rPr>
+                <a:t> </a:t>
+              </a:r>
+              <a:r>
+                <a:rPr lang="en-US" sz="2900" dirty="0">
+                  <a:latin typeface="Calibri" charset="0"/>
+                  <a:ea typeface="Calibri" charset="0"/>
+                  <a:cs typeface="Calibri" charset="0"/>
+                </a:rPr>
+                <a:t>Theory </a:t>
+              </a:r>
+              <a:r>
+                <a:rPr lang="en-US" sz="2900" dirty="0" smtClean="0">
+                  <a:latin typeface="Calibri" charset="0"/>
+                  <a:ea typeface="Calibri" charset="0"/>
+                  <a:cs typeface="Calibri" charset="0"/>
+                </a:rPr>
+                <a:t>(</a:t>
+              </a:r>
+              <a:r>
+                <a:rPr lang="en-US" sz="2900" dirty="0" err="1" smtClean="0">
+                  <a:latin typeface="Calibri" charset="0"/>
+                  <a:ea typeface="Calibri" charset="0"/>
+                  <a:cs typeface="Calibri" charset="0"/>
+                </a:rPr>
+                <a:t>Endriss</a:t>
+              </a:r>
+              <a:r>
+                <a:rPr lang="en-US" sz="2900" dirty="0" smtClean="0">
+                  <a:latin typeface="Calibri" charset="0"/>
+                  <a:ea typeface="Calibri" charset="0"/>
+                  <a:cs typeface="Calibri" charset="0"/>
+                </a:rPr>
+                <a:t>)</a:t>
+              </a:r>
+              <a:endParaRPr lang="en-US" sz="2900" dirty="0">
+                <a:latin typeface="Calibri" charset="0"/>
+                <a:ea typeface="Calibri" charset="0"/>
+                <a:cs typeface="Calibri" charset="0"/>
+              </a:endParaRPr>
             </a:p>
           </p:txBody>
         </p:sp>
@@ -4481,12 +4824,21 @@
               </a:r>
               <a:r>
                 <a:rPr lang="en-US" sz="2900" dirty="0" err="1"/>
-                <a:t>MScCS</a:t>
+                <a:t>MoL</a:t>
               </a:r>
               <a:r>
                 <a:rPr lang="en-US" sz="2900" dirty="0"/>
-                <a:t>-VU] Protocol Validation (Fokkink)</a:t>
-              </a:r>
+                <a:t>-FNWI] Computational Social Choice (</a:t>
+              </a:r>
+              <a:r>
+                <a:rPr lang="en-US" sz="2900" dirty="0" err="1"/>
+                <a:t>Endriss</a:t>
+              </a:r>
+              <a:r>
+                <a:rPr lang="en-US" sz="2900" dirty="0" smtClean="0"/>
+                <a:t>)</a:t>
+              </a:r>
+              <a:endParaRPr lang="en-US" sz="2900" dirty="0"/>
             </a:p>
           </p:txBody>
         </p:sp>
@@ -5110,35 +5462,26 @@
                   <a:gd name="adj" fmla="val 16667"/>
                 </a:avLst>
               </a:prstGeom>
-              <a:gradFill flip="none" rotWithShape="1">
-                <a:gsLst>
-                  <a:gs pos="0">
-                    <a:srgbClr val="FFD1BB"/>
-                  </a:gs>
-                  <a:gs pos="35000">
-                    <a:srgbClr val="FFDECF"/>
-                  </a:gs>
-                  <a:gs pos="100000">
-                    <a:srgbClr val="FFF2ED"/>
-                  </a:gs>
-                </a:gsLst>
-                <a:lin ang="16200000" scaled="0"/>
-              </a:gradFill>
-              <a:ln w="76200" cap="flat">
+              <a:ln w="76200">
                 <a:solidFill>
-                  <a:srgbClr val="000000"/>
+                  <a:schemeClr val="tx1"/>
                 </a:solidFill>
-                <a:prstDash val="solid"/>
-                <a:bevel/>
               </a:ln>
-              <a:effectLst>
-                <a:outerShdw blurRad="38100" dist="20000" dir="5400000" rotWithShape="0">
-                  <a:srgbClr val="000000">
-                    <a:alpha val="38000"/>
-                  </a:srgbClr>
-                </a:outerShdw>
-              </a:effectLst>
             </p:spPr>
+            <p:style>
+              <a:lnRef idx="1">
+                <a:schemeClr val="accent4"/>
+              </a:lnRef>
+              <a:fillRef idx="2">
+                <a:schemeClr val="accent4"/>
+              </a:fillRef>
+              <a:effectRef idx="1">
+                <a:schemeClr val="accent4"/>
+              </a:effectRef>
+              <a:fontRef idx="minor">
+                <a:schemeClr val="dk1"/>
+              </a:fontRef>
+            </p:style>
             <p:txBody>
               <a:bodyPr wrap="square" lIns="0" tIns="0" rIns="0" bIns="0" numCol="1" anchor="ctr">
                 <a:noAutofit/>
@@ -5149,23 +5492,43 @@
                   <a:defRPr sz="1800"/>
                 </a:pPr>
                 <a:r>
-                  <a:rPr lang="en-US" sz="2900" dirty="0"/>
+                  <a:rPr lang="en-US" sz="2900" dirty="0">
+                    <a:latin typeface="Calibri" charset="0"/>
+                    <a:ea typeface="Calibri" charset="0"/>
+                    <a:cs typeface="Calibri" charset="0"/>
+                  </a:rPr>
                   <a:t>[</a:t>
                 </a:r>
                 <a:r>
-                  <a:rPr lang="en-US" sz="2900" dirty="0" err="1"/>
+                  <a:rPr lang="en-US" sz="2900" dirty="0" err="1">
+                    <a:latin typeface="Calibri" charset="0"/>
+                    <a:ea typeface="Calibri" charset="0"/>
+                    <a:cs typeface="Calibri" charset="0"/>
+                  </a:rPr>
                   <a:t>MoL</a:t>
                 </a:r>
                 <a:r>
-                  <a:rPr lang="en-US" sz="2900" dirty="0"/>
+                  <a:rPr lang="en-US" sz="2900" dirty="0">
+                    <a:latin typeface="Calibri" charset="0"/>
+                    <a:ea typeface="Calibri" charset="0"/>
+                    <a:cs typeface="Calibri" charset="0"/>
+                  </a:rPr>
                   <a:t>-FGW] Structures for Semantics (</a:t>
                 </a:r>
                 <a:r>
-                  <a:rPr lang="en-US" sz="2900" dirty="0" err="1"/>
+                  <a:rPr lang="en-US" sz="2900" dirty="0" err="1">
+                    <a:latin typeface="Calibri" charset="0"/>
+                    <a:ea typeface="Calibri" charset="0"/>
+                    <a:cs typeface="Calibri" charset="0"/>
+                  </a:rPr>
                   <a:t>Aloni</a:t>
                 </a:r>
                 <a:r>
-                  <a:rPr lang="en-US" sz="2900" dirty="0"/>
+                  <a:rPr lang="en-US" sz="2900" dirty="0">
+                    <a:latin typeface="Calibri" charset="0"/>
+                    <a:ea typeface="Calibri" charset="0"/>
+                    <a:cs typeface="Calibri" charset="0"/>
+                  </a:rPr>
                   <a:t>)</a:t>
                 </a:r>
               </a:p>
@@ -5706,35 +6069,22 @@
                 <a:gd name="adj" fmla="val 16667"/>
               </a:avLst>
             </a:prstGeom>
-            <a:gradFill flip="none" rotWithShape="1">
-              <a:gsLst>
-                <a:gs pos="0">
-                  <a:srgbClr val="DAFEA4"/>
-                </a:gs>
-                <a:gs pos="35000">
-                  <a:srgbClr val="E4FDBF"/>
-                </a:gs>
-                <a:gs pos="100000">
-                  <a:srgbClr val="F5FFE6"/>
-                </a:gs>
-              </a:gsLst>
-              <a:lin ang="16200000" scaled="0"/>
-            </a:gradFill>
-            <a:ln w="9525" cap="flat">
-              <a:solidFill>
-                <a:srgbClr val="98B955"/>
-              </a:solidFill>
-              <a:prstDash val="solid"/>
-              <a:bevel/>
-            </a:ln>
-            <a:effectLst>
-              <a:outerShdw blurRad="38100" dist="20000" dir="5400000" rotWithShape="0">
-                <a:srgbClr val="000000">
-                  <a:alpha val="38000"/>
-                </a:srgbClr>
-              </a:outerShdw>
-            </a:effectLst>
+            <a:ln/>
           </p:spPr>
+          <p:style>
+            <a:lnRef idx="1">
+              <a:schemeClr val="accent4"/>
+            </a:lnRef>
+            <a:fillRef idx="2">
+              <a:schemeClr val="accent4"/>
+            </a:fillRef>
+            <a:effectRef idx="1">
+              <a:schemeClr val="accent4"/>
+            </a:effectRef>
+            <a:fontRef idx="minor">
+              <a:schemeClr val="dk1"/>
+            </a:fontRef>
+          </p:style>
           <p:txBody>
             <a:bodyPr wrap="square" lIns="0" tIns="0" rIns="0" bIns="0" numCol="1" anchor="ctr">
               <a:noAutofit/>
@@ -5745,15 +6095,27 @@
                 <a:defRPr sz="1800"/>
               </a:pPr>
               <a:r>
-                <a:rPr lang="en-US" sz="2900" dirty="0"/>
+                <a:rPr lang="en-US" sz="2900" dirty="0">
+                  <a:latin typeface="Calibri" charset="0"/>
+                  <a:ea typeface="Calibri" charset="0"/>
+                  <a:cs typeface="Calibri" charset="0"/>
+                </a:rPr>
                 <a:t>[</a:t>
               </a:r>
               <a:r>
-                <a:rPr lang="en-US" sz="2900" dirty="0" err="1"/>
+                <a:rPr lang="en-US" sz="2900" dirty="0" err="1">
+                  <a:latin typeface="Calibri" charset="0"/>
+                  <a:ea typeface="Calibri" charset="0"/>
+                  <a:cs typeface="Calibri" charset="0"/>
+                </a:rPr>
                 <a:t>MoL</a:t>
               </a:r>
               <a:r>
-                <a:rPr lang="en-US" sz="2900" dirty="0"/>
+                <a:rPr lang="en-US" sz="2900" dirty="0">
+                  <a:latin typeface="Calibri" charset="0"/>
+                  <a:ea typeface="Calibri" charset="0"/>
+                  <a:cs typeface="Calibri" charset="0"/>
+                </a:rPr>
                 <a:t>-FGW] Philosophy of Mathematics (Incurvati)</a:t>
               </a:r>
             </a:p>
@@ -6136,9 +6498,9 @@
         <p:grpSpPr>
           <a:xfrm>
             <a:off x="6313868" y="424711"/>
-            <a:ext cx="20086501" cy="9067854"/>
+            <a:ext cx="20086501" cy="11383457"/>
             <a:chOff x="6747000" y="328456"/>
-            <a:chExt cx="20086501" cy="9067855"/>
+            <a:chExt cx="20086501" cy="11383458"/>
           </a:xfrm>
         </p:grpSpPr>
         <p:sp>
@@ -6626,7 +6988,6 @@
                 <a:rPr lang="en-US" sz="2900" dirty="0"/>
                 <a:t>modern philosophy of language (Maat)</a:t>
               </a:r>
-              <a:endParaRPr lang="en-US" sz="2900" dirty="0"/>
             </a:p>
           </p:txBody>
         </p:sp>
@@ -6722,8 +7083,8 @@
           </p:nvSpPr>
           <p:spPr>
             <a:xfrm>
-              <a:off x="10504221" y="3660938"/>
-              <a:ext cx="3013179" cy="2429822"/>
+              <a:off x="10140755" y="3660938"/>
+              <a:ext cx="3376646" cy="2429822"/>
             </a:xfrm>
             <a:prstGeom prst="roundRect">
               <a:avLst>
@@ -6778,7 +7139,15 @@
               </a:r>
               <a:r>
                 <a:rPr lang="en-US" sz="2900" dirty="0"/>
-                <a:t>-FGW] Wittgenstein's Relevance: Sources (Stokhof)</a:t>
+                <a:t>-FGW] </a:t>
+              </a:r>
+              <a:r>
+                <a:rPr lang="en-US" sz="2900" dirty="0"/>
+                <a:t>Ethics, Ontology, Life: Wittgenstein's Later Work </a:t>
+              </a:r>
+              <a:r>
+                <a:rPr lang="en-US" sz="2900" dirty="0"/>
+                <a:t>(Stokhof)</a:t>
               </a:r>
             </a:p>
           </p:txBody>
@@ -6912,12 +7281,33 @@
               </a:r>
               <a:r>
                 <a:rPr lang="en-US" sz="2900" dirty="0" err="1"/>
-                <a:t>MAPhil</a:t>
+                <a:t>MoL</a:t>
               </a:r>
               <a:r>
                 <a:rPr lang="en-US" sz="2900" dirty="0"/>
-                <a:t>] Early Modern Philosophy of Language (Maat)</a:t>
-              </a:r>
+                <a:t>-FNWI] Intuitionistic Logic (</a:t>
+              </a:r>
+              <a:r>
+                <a:rPr lang="en-US" sz="2900" dirty="0" smtClean="0"/>
+                <a:t>de </a:t>
+              </a:r>
+              <a:r>
+                <a:rPr lang="en-US" sz="2900" dirty="0" err="1" smtClean="0"/>
+                <a:t>Jongh</a:t>
+              </a:r>
+              <a:r>
+                <a:rPr lang="en-US" sz="2900" dirty="0" smtClean="0"/>
+                <a:t> </a:t>
+              </a:r>
+              <a:r>
+                <a:rPr lang="en-US" sz="2900" dirty="0"/>
+                <a:t>and Ciardelli</a:t>
+              </a:r>
+              <a:r>
+                <a:rPr lang="en-US" sz="2900" dirty="0" smtClean="0"/>
+                <a:t>)</a:t>
+              </a:r>
+              <a:endParaRPr lang="en-US" sz="2900" dirty="0"/>
             </a:p>
           </p:txBody>
         </p:sp>
@@ -6998,7 +7388,7 @@
           </p:nvSpPr>
           <p:spPr>
             <a:xfrm>
-              <a:off x="11994692" y="6948298"/>
+              <a:off x="13152991" y="7140257"/>
               <a:ext cx="3013179" cy="2429822"/>
             </a:xfrm>
             <a:prstGeom prst="roundRect">
@@ -7067,7 +7457,7 @@
           </p:nvSpPr>
           <p:spPr>
             <a:xfrm>
-              <a:off x="13541463" y="3660938"/>
+              <a:off x="14320563" y="9282092"/>
               <a:ext cx="3013179" cy="2429822"/>
             </a:xfrm>
             <a:prstGeom prst="roundRect">
@@ -7572,35 +7962,22 @@
                 <a:gd name="adj" fmla="val 16667"/>
               </a:avLst>
             </a:prstGeom>
-            <a:gradFill flip="none" rotWithShape="1">
-              <a:gsLst>
-                <a:gs pos="0">
-                  <a:srgbClr val="C8B2E9"/>
-                </a:gs>
-                <a:gs pos="35000">
-                  <a:srgbClr val="D8C9EE"/>
-                </a:gs>
-                <a:gs pos="100000">
-                  <a:srgbClr val="FFD1BB"/>
-                </a:gs>
-              </a:gsLst>
-              <a:lin ang="5400000" scaled="0"/>
-            </a:gradFill>
-            <a:ln w="12700" cap="flat" cmpd="sng">
-              <a:solidFill>
-                <a:srgbClr val="000000"/>
-              </a:solidFill>
-              <a:prstDash val="solid"/>
-              <a:bevel/>
-            </a:ln>
-            <a:effectLst>
-              <a:outerShdw blurRad="38100" dist="20000" dir="5400000" rotWithShape="0">
-                <a:srgbClr val="000000">
-                  <a:alpha val="38000"/>
-                </a:srgbClr>
-              </a:outerShdw>
-            </a:effectLst>
+            <a:ln/>
           </p:spPr>
+          <p:style>
+            <a:lnRef idx="1">
+              <a:schemeClr val="accent2"/>
+            </a:lnRef>
+            <a:fillRef idx="2">
+              <a:schemeClr val="accent2"/>
+            </a:fillRef>
+            <a:effectRef idx="1">
+              <a:schemeClr val="accent2"/>
+            </a:effectRef>
+            <a:fontRef idx="minor">
+              <a:schemeClr val="dk1"/>
+            </a:fontRef>
+          </p:style>
           <p:txBody>
             <a:bodyPr wrap="square" lIns="0" tIns="0" rIns="0" bIns="0" numCol="1" anchor="ctr">
               <a:noAutofit/>
@@ -7609,17 +7986,50 @@
             <a:p>
               <a:pPr algn="ctr"/>
               <a:r>
-                <a:rPr lang="en-US" sz="2900" dirty="0"/>
+                <a:rPr lang="en-US" sz="2900" dirty="0">
+                  <a:latin typeface="Calibri" charset="0"/>
+                  <a:ea typeface="Calibri" charset="0"/>
+                  <a:cs typeface="Calibri" charset="0"/>
+                </a:rPr>
                 <a:t>[</a:t>
               </a:r>
               <a:r>
-                <a:rPr lang="en-US" sz="2900" dirty="0" err="1"/>
-                <a:t>MastMath</a:t>
-              </a:r>
-              <a:r>
-                <a:rPr lang="en-US" sz="2900" dirty="0"/>
-                <a:t>] Category Theory and Topos Theory (vOosten) [8EC]</a:t>
-              </a:r>
+                <a:rPr lang="en-US" sz="2900" dirty="0" err="1">
+                  <a:latin typeface="Calibri" charset="0"/>
+                  <a:ea typeface="Calibri" charset="0"/>
+                  <a:cs typeface="Calibri" charset="0"/>
+                </a:rPr>
+                <a:t>MoL</a:t>
+              </a:r>
+              <a:r>
+                <a:rPr lang="en-US" sz="2900" dirty="0">
+                  <a:latin typeface="Calibri" charset="0"/>
+                  <a:ea typeface="Calibri" charset="0"/>
+                  <a:cs typeface="Calibri" charset="0"/>
+                </a:rPr>
+                <a:t>-FNWI] Category Theory (</a:t>
+              </a:r>
+              <a:r>
+                <a:rPr lang="en-US" sz="2900" dirty="0" err="1">
+                  <a:latin typeface="Calibri" charset="0"/>
+                  <a:ea typeface="Calibri" charset="0"/>
+                  <a:cs typeface="Calibri" charset="0"/>
+                </a:rPr>
+                <a:t>vdBerg</a:t>
+              </a:r>
+              <a:r>
+                <a:rPr lang="en-US" sz="2900" dirty="0">
+                  <a:latin typeface="Calibri" charset="0"/>
+                  <a:ea typeface="Calibri" charset="0"/>
+                  <a:cs typeface="Calibri" charset="0"/>
+                </a:rPr>
+                <a:t>)</a:t>
+              </a:r>
+              <a:endParaRPr lang="en-US" sz="2900" dirty="0">
+                <a:latin typeface="Calibri" charset="0"/>
+                <a:ea typeface="Calibri" charset="0"/>
+                <a:cs typeface="Calibri" charset="0"/>
+              </a:endParaRPr>
             </a:p>
           </p:txBody>
         </p:sp>
@@ -7830,11 +8240,7 @@
               </a:r>
               <a:r>
                 <a:rPr lang="en-US" sz="2900" dirty="0"/>
-                <a:t>] </a:t>
-              </a:r>
-              <a:r>
-                <a:rPr lang="en-US" sz="2900" dirty="0"/>
-                <a:t>Mathematical Structures in Logic (Bezhanishvili)</a:t>
+                <a:t>] Mathematical Structures in Logic (Bezhanishvili)</a:t>
               </a:r>
             </a:p>
           </p:txBody>
@@ -8772,7 +9178,6 @@
                 <a:rPr lang="en-US" sz="2900" dirty="0"/>
                 <a:t>)</a:t>
               </a:r>
-              <a:endParaRPr lang="en-US" sz="2900" dirty="0"/>
             </a:p>
           </p:txBody>
         </p:sp>
@@ -8861,35 +9266,22 @@
                 <a:gd name="adj" fmla="val 16667"/>
               </a:avLst>
             </a:prstGeom>
-            <a:gradFill flip="none" rotWithShape="1">
-              <a:gsLst>
-                <a:gs pos="0">
-                  <a:srgbClr val="C8B2E9"/>
-                </a:gs>
-                <a:gs pos="35000">
-                  <a:srgbClr val="D8C9EE"/>
-                </a:gs>
-                <a:gs pos="100000">
-                  <a:srgbClr val="F0EAF9"/>
-                </a:gs>
-              </a:gsLst>
-              <a:lin ang="16200000" scaled="0"/>
-            </a:gradFill>
-            <a:ln w="9525" cap="flat">
-              <a:solidFill>
-                <a:srgbClr val="7D60A0"/>
-              </a:solidFill>
-              <a:prstDash val="solid"/>
-              <a:bevel/>
-            </a:ln>
-            <a:effectLst>
-              <a:outerShdw blurRad="38100" dist="20000" dir="5400000" rotWithShape="0">
-                <a:srgbClr val="000000">
-                  <a:alpha val="38000"/>
-                </a:srgbClr>
-              </a:outerShdw>
-            </a:effectLst>
+            <a:ln/>
           </p:spPr>
+          <p:style>
+            <a:lnRef idx="1">
+              <a:schemeClr val="accent6"/>
+            </a:lnRef>
+            <a:fillRef idx="2">
+              <a:schemeClr val="accent6"/>
+            </a:fillRef>
+            <a:effectRef idx="1">
+              <a:schemeClr val="accent6"/>
+            </a:effectRef>
+            <a:fontRef idx="minor">
+              <a:schemeClr val="dk1"/>
+            </a:fontRef>
+          </p:style>
           <p:txBody>
             <a:bodyPr wrap="square" lIns="0" tIns="0" rIns="0" bIns="0" numCol="1" anchor="ctr">
               <a:noAutofit/>
@@ -8900,15 +9292,27 @@
                 <a:defRPr sz="1800"/>
               </a:pPr>
               <a:r>
-                <a:rPr lang="en-US" sz="2900" dirty="0"/>
+                <a:rPr lang="en-US" sz="2900" dirty="0">
+                  <a:latin typeface="Calibri" charset="0"/>
+                  <a:ea typeface="Calibri" charset="0"/>
+                  <a:cs typeface="Calibri" charset="0"/>
+                </a:rPr>
                 <a:t>[</a:t>
               </a:r>
               <a:r>
-                <a:rPr lang="en-US" sz="2900" dirty="0" err="1"/>
+                <a:rPr lang="en-US" sz="2900" dirty="0" err="1">
+                  <a:latin typeface="Calibri" charset="0"/>
+                  <a:ea typeface="Calibri" charset="0"/>
+                  <a:cs typeface="Calibri" charset="0"/>
+                </a:rPr>
                 <a:t>MoL</a:t>
               </a:r>
               <a:r>
-                <a:rPr lang="en-US" sz="2900" dirty="0"/>
+                <a:rPr lang="en-US" sz="2900" dirty="0">
+                  <a:latin typeface="Calibri" charset="0"/>
+                  <a:ea typeface="Calibri" charset="0"/>
+                  <a:cs typeface="Calibri" charset="0"/>
+                </a:rPr>
                 <a:t>-FNWI] Logical Methods in Cognitive Science (Szymanik)</a:t>
               </a:r>
             </a:p>
@@ -10019,15 +10423,7 @@
             </a:r>
             <a:r>
               <a:rPr lang="en-US" sz="2900" dirty="0"/>
-              <a:t>-FNWI] Basic </a:t>
-            </a:r>
-            <a:r>
-              <a:rPr lang="en-US" sz="2900" dirty="0"/>
-              <a:t>Probability: Programming  </a:t>
-            </a:r>
-            <a:r>
-              <a:rPr lang="en-US" sz="2900" dirty="0"/>
-              <a:t>(</a:t>
+              <a:t>-FNWI] Basic Probability: Programming  (</a:t>
             </a:r>
             <a:r>
               <a:rPr lang="en-US" sz="2900" dirty="0" err="1"/>
@@ -10035,11 +10431,7 @@
             </a:r>
             <a:r>
               <a:rPr lang="en-US" sz="2900" dirty="0"/>
-              <a:t>, Schulz) </a:t>
-            </a:r>
-            <a:r>
-              <a:rPr lang="en-US" sz="2900" dirty="0"/>
-              <a:t>[3EC]</a:t>
+              <a:t>, Schulz) [3EC]</a:t>
             </a:r>
           </a:p>
         </p:txBody>
@@ -10422,7 +10814,6 @@
               <a:rPr lang="en-US" sz="2900" dirty="0"/>
               <a:t>inference: philosophical theory and modern practice (Schulz)</a:t>
             </a:r>
-            <a:endParaRPr lang="en-US" sz="2900" dirty="0"/>
           </a:p>
         </p:txBody>
       </p:sp>
@@ -10491,6 +10882,89 @@
             <a:r>
               <a:rPr lang="en-US" sz="2900" dirty="0"/>
               <a:t>]  Cognition and Language Development (Schaeffer)</a:t>
+            </a:r>
+          </a:p>
+        </p:txBody>
+      </p:sp>
+      <p:sp>
+        <p:nvSpPr>
+          <p:cNvPr id="137" name="Shape 139"/>
+          <p:cNvSpPr/>
+          <p:nvPr/>
+        </p:nvSpPr>
+        <p:spPr>
+          <a:xfrm>
+            <a:off x="9576377" y="7164688"/>
+            <a:ext cx="3013179" cy="2429822"/>
+          </a:xfrm>
+          <a:prstGeom prst="roundRect">
+            <a:avLst>
+              <a:gd name="adj" fmla="val 16667"/>
+            </a:avLst>
+          </a:prstGeom>
+          <a:gradFill flip="none" rotWithShape="1">
+            <a:gsLst>
+              <a:gs pos="0">
+                <a:srgbClr val="C8B2E9"/>
+              </a:gs>
+              <a:gs pos="35000">
+                <a:srgbClr val="D8C9EE"/>
+              </a:gs>
+              <a:gs pos="100000">
+                <a:srgbClr val="F0EAF9"/>
+              </a:gs>
+            </a:gsLst>
+            <a:lin ang="16200000" scaled="0"/>
+          </a:gradFill>
+          <a:ln w="9525" cap="flat">
+            <a:solidFill>
+              <a:srgbClr val="7D60A0"/>
+            </a:solidFill>
+            <a:prstDash val="solid"/>
+            <a:bevel/>
+          </a:ln>
+          <a:effectLst>
+            <a:outerShdw blurRad="38100" dist="20000" dir="5400000" rotWithShape="0">
+              <a:srgbClr val="000000">
+                <a:alpha val="38000"/>
+              </a:srgbClr>
+            </a:outerShdw>
+          </a:effectLst>
+        </p:spPr>
+        <p:txBody>
+          <a:bodyPr wrap="square" lIns="0" tIns="0" rIns="0" bIns="0" numCol="1" anchor="ctr">
+            <a:noAutofit/>
+          </a:bodyPr>
+          <a:lstStyle/>
+          <a:p>
+            <a:pPr lvl="0" algn="ctr">
+              <a:defRPr sz="1800"/>
+            </a:pPr>
+            <a:r>
+              <a:rPr lang="en-US" sz="2900" dirty="0" smtClean="0"/>
+              <a:t>[</a:t>
+            </a:r>
+            <a:r>
+              <a:rPr lang="en-US" sz="2900" dirty="0" err="1" smtClean="0"/>
+              <a:t>MAPhil</a:t>
+            </a:r>
+            <a:r>
+              <a:rPr lang="en-US" sz="2900" dirty="0"/>
+              <a:t>] </a:t>
+            </a:r>
+            <a:endParaRPr lang="en-US" sz="2900" dirty="0" smtClean="0"/>
+          </a:p>
+          <a:p>
+            <a:pPr lvl="0" algn="ctr">
+              <a:defRPr sz="1800"/>
+            </a:pPr>
+            <a:r>
+              <a:rPr lang="en-US" sz="2900" dirty="0" smtClean="0"/>
+              <a:t>Techno-science </a:t>
+            </a:r>
+            <a:r>
+              <a:rPr lang="en-US" sz="2900" dirty="0"/>
+              <a:t>and epistemology (Russo) </a:t>
             </a:r>
             <a:endParaRPr lang="en-US" sz="2900" dirty="0"/>
           </a:p>
@@ -12461,4 +12935,265 @@
   </a:objectDefaults>
   <a:extraClrSchemeLst/>
 </a:theme>
+</file>
+
+<file path=ppt/theme/theme3.xml><?xml version="1.0" encoding="utf-8"?>
+<a:theme xmlns:a="http://schemas.openxmlformats.org/drawingml/2006/main" name="Office Theme">
+  <a:themeElements>
+    <a:clrScheme name="Office">
+      <a:dk1>
+        <a:sysClr val="windowText" lastClr="000000"/>
+      </a:dk1>
+      <a:lt1>
+        <a:sysClr val="window" lastClr="FFFFFF"/>
+      </a:lt1>
+      <a:dk2>
+        <a:srgbClr val="44546A"/>
+      </a:dk2>
+      <a:lt2>
+        <a:srgbClr val="E7E6E6"/>
+      </a:lt2>
+      <a:accent1>
+        <a:srgbClr val="5B9BD5"/>
+      </a:accent1>
+      <a:accent2>
+        <a:srgbClr val="ED7D31"/>
+      </a:accent2>
+      <a:accent3>
+        <a:srgbClr val="A5A5A5"/>
+      </a:accent3>
+      <a:accent4>
+        <a:srgbClr val="FFC000"/>
+      </a:accent4>
+      <a:accent5>
+        <a:srgbClr val="4472C4"/>
+      </a:accent5>
+      <a:accent6>
+        <a:srgbClr val="70AD47"/>
+      </a:accent6>
+      <a:hlink>
+        <a:srgbClr val="0563C1"/>
+      </a:hlink>
+      <a:folHlink>
+        <a:srgbClr val="954F72"/>
+      </a:folHlink>
+    </a:clrScheme>
+    <a:fontScheme name="Office">
+      <a:majorFont>
+        <a:latin typeface="Calibri Light" panose="020F0302020204030204"/>
+        <a:ea typeface=""/>
+        <a:cs typeface=""/>
+        <a:font script="Jpan" typeface="Yu Gothic Light"/>
+        <a:font script="Hang" typeface="맑은 고딕"/>
+        <a:font script="Hans" typeface="DengXian Light"/>
+        <a:font script="Hant" typeface="新細明體"/>
+        <a:font script="Arab" typeface="Times New Roman"/>
+        <a:font script="Hebr" typeface="Times New Roman"/>
+        <a:font script="Thai" typeface="Angsana New"/>
+        <a:font script="Ethi" typeface="Nyala"/>
+        <a:font script="Beng" typeface="Vrinda"/>
+        <a:font script="Gujr" typeface="Shruti"/>
+        <a:font script="Khmr" typeface="MoolBoran"/>
+        <a:font script="Knda" typeface="Tunga"/>
+        <a:font script="Guru" typeface="Raavi"/>
+        <a:font script="Cans" typeface="Euphemia"/>
+        <a:font script="Cher" typeface="Plantagenet Cherokee"/>
+        <a:font script="Yiii" typeface="Microsoft Yi Baiti"/>
+        <a:font script="Tibt" typeface="Microsoft Himalaya"/>
+        <a:font script="Thaa" typeface="MV Boli"/>
+        <a:font script="Deva" typeface="Mangal"/>
+        <a:font script="Telu" typeface="Gautami"/>
+        <a:font script="Taml" typeface="Latha"/>
+        <a:font script="Syrc" typeface="Estrangelo Edessa"/>
+        <a:font script="Orya" typeface="Kalinga"/>
+        <a:font script="Mlym" typeface="Kartika"/>
+        <a:font script="Laoo" typeface="DokChampa"/>
+        <a:font script="Sinh" typeface="Iskoola Pota"/>
+        <a:font script="Mong" typeface="Mongolian Baiti"/>
+        <a:font script="Viet" typeface="Times New Roman"/>
+        <a:font script="Uigh" typeface="Microsoft Uighur"/>
+        <a:font script="Geor" typeface="Sylfaen"/>
+      </a:majorFont>
+      <a:minorFont>
+        <a:latin typeface="Calibri" panose="020F0502020204030204"/>
+        <a:ea typeface=""/>
+        <a:cs typeface=""/>
+        <a:font script="Jpan" typeface="Yu Gothic"/>
+        <a:font script="Hang" typeface="맑은 고딕"/>
+        <a:font script="Hans" typeface="DengXian"/>
+        <a:font script="Hant" typeface="新細明體"/>
+        <a:font script="Arab" typeface="Arial"/>
+        <a:font script="Hebr" typeface="Arial"/>
+        <a:font script="Thai" typeface="Cordia New"/>
+        <a:font script="Ethi" typeface="Nyala"/>
+        <a:font script="Beng" typeface="Vrinda"/>
+        <a:font script="Gujr" typeface="Shruti"/>
+        <a:font script="Khmr" typeface="DaunPenh"/>
+        <a:font script="Knda" typeface="Tunga"/>
+        <a:font script="Guru" typeface="Raavi"/>
+        <a:font script="Cans" typeface="Euphemia"/>
+        <a:font script="Cher" typeface="Plantagenet Cherokee"/>
+        <a:font script="Yiii" typeface="Microsoft Yi Baiti"/>
+        <a:font script="Tibt" typeface="Microsoft Himalaya"/>
+        <a:font script="Thaa" typeface="MV Boli"/>
+        <a:font script="Deva" typeface="Mangal"/>
+        <a:font script="Telu" typeface="Gautami"/>
+        <a:font script="Taml" typeface="Latha"/>
+        <a:font script="Syrc" typeface="Estrangelo Edessa"/>
+        <a:font script="Orya" typeface="Kalinga"/>
+        <a:font script="Mlym" typeface="Kartika"/>
+        <a:font script="Laoo" typeface="DokChampa"/>
+        <a:font script="Sinh" typeface="Iskoola Pota"/>
+        <a:font script="Mong" typeface="Mongolian Baiti"/>
+        <a:font script="Viet" typeface="Arial"/>
+        <a:font script="Uigh" typeface="Microsoft Uighur"/>
+        <a:font script="Geor" typeface="Sylfaen"/>
+      </a:minorFont>
+    </a:fontScheme>
+    <a:fmtScheme name="Office">
+      <a:fillStyleLst>
+        <a:solidFill>
+          <a:schemeClr val="phClr"/>
+        </a:solidFill>
+        <a:gradFill rotWithShape="1">
+          <a:gsLst>
+            <a:gs pos="0">
+              <a:schemeClr val="phClr">
+                <a:lumMod val="110000"/>
+                <a:satMod val="105000"/>
+                <a:tint val="67000"/>
+              </a:schemeClr>
+            </a:gs>
+            <a:gs pos="50000">
+              <a:schemeClr val="phClr">
+                <a:lumMod val="105000"/>
+                <a:satMod val="103000"/>
+                <a:tint val="73000"/>
+              </a:schemeClr>
+            </a:gs>
+            <a:gs pos="100000">
+              <a:schemeClr val="phClr">
+                <a:lumMod val="105000"/>
+                <a:satMod val="109000"/>
+                <a:tint val="81000"/>
+              </a:schemeClr>
+            </a:gs>
+          </a:gsLst>
+          <a:lin ang="5400000" scaled="0"/>
+        </a:gradFill>
+        <a:gradFill rotWithShape="1">
+          <a:gsLst>
+            <a:gs pos="0">
+              <a:schemeClr val="phClr">
+                <a:satMod val="103000"/>
+                <a:lumMod val="102000"/>
+                <a:tint val="94000"/>
+              </a:schemeClr>
+            </a:gs>
+            <a:gs pos="50000">
+              <a:schemeClr val="phClr">
+                <a:satMod val="110000"/>
+                <a:lumMod val="100000"/>
+                <a:shade val="100000"/>
+              </a:schemeClr>
+            </a:gs>
+            <a:gs pos="100000">
+              <a:schemeClr val="phClr">
+                <a:lumMod val="99000"/>
+                <a:satMod val="120000"/>
+                <a:shade val="78000"/>
+              </a:schemeClr>
+            </a:gs>
+          </a:gsLst>
+          <a:lin ang="5400000" scaled="0"/>
+        </a:gradFill>
+      </a:fillStyleLst>
+      <a:lnStyleLst>
+        <a:ln w="6350" cap="flat" cmpd="sng" algn="ctr">
+          <a:solidFill>
+            <a:schemeClr val="phClr"/>
+          </a:solidFill>
+          <a:prstDash val="solid"/>
+          <a:miter lim="800000"/>
+        </a:ln>
+        <a:ln w="12700" cap="flat" cmpd="sng" algn="ctr">
+          <a:solidFill>
+            <a:schemeClr val="phClr"/>
+          </a:solidFill>
+          <a:prstDash val="solid"/>
+          <a:miter lim="800000"/>
+        </a:ln>
+        <a:ln w="19050" cap="flat" cmpd="sng" algn="ctr">
+          <a:solidFill>
+            <a:schemeClr val="phClr"/>
+          </a:solidFill>
+          <a:prstDash val="solid"/>
+          <a:miter lim="800000"/>
+        </a:ln>
+      </a:lnStyleLst>
+      <a:effectStyleLst>
+        <a:effectStyle>
+          <a:effectLst/>
+        </a:effectStyle>
+        <a:effectStyle>
+          <a:effectLst/>
+        </a:effectStyle>
+        <a:effectStyle>
+          <a:effectLst>
+            <a:outerShdw blurRad="57150" dist="19050" dir="5400000" algn="ctr" rotWithShape="0">
+              <a:srgbClr val="000000">
+                <a:alpha val="63000"/>
+              </a:srgbClr>
+            </a:outerShdw>
+          </a:effectLst>
+        </a:effectStyle>
+      </a:effectStyleLst>
+      <a:bgFillStyleLst>
+        <a:solidFill>
+          <a:schemeClr val="phClr"/>
+        </a:solidFill>
+        <a:solidFill>
+          <a:schemeClr val="phClr">
+            <a:tint val="95000"/>
+            <a:satMod val="170000"/>
+          </a:schemeClr>
+        </a:solidFill>
+        <a:gradFill rotWithShape="1">
+          <a:gsLst>
+            <a:gs pos="0">
+              <a:schemeClr val="phClr">
+                <a:tint val="93000"/>
+                <a:satMod val="150000"/>
+                <a:shade val="98000"/>
+                <a:lumMod val="102000"/>
+              </a:schemeClr>
+            </a:gs>
+            <a:gs pos="50000">
+              <a:schemeClr val="phClr">
+                <a:tint val="98000"/>
+                <a:satMod val="130000"/>
+                <a:shade val="90000"/>
+                <a:lumMod val="103000"/>
+              </a:schemeClr>
+            </a:gs>
+            <a:gs pos="100000">
+              <a:schemeClr val="phClr">
+                <a:shade val="63000"/>
+                <a:satMod val="120000"/>
+              </a:schemeClr>
+            </a:gs>
+          </a:gsLst>
+          <a:lin ang="5400000" scaled="0"/>
+        </a:gradFill>
+      </a:bgFillStyleLst>
+    </a:fmtScheme>
+  </a:themeElements>
+  <a:objectDefaults/>
+  <a:extraClrSchemeLst/>
+  <a:extLst>
+    <a:ext uri="{05A4C25C-085E-4340-85A3-A5531E510DB2}">
+      <thm15:themeFamily xmlns:thm15="http://schemas.microsoft.com/office/thememl/2012/main" name="Office Theme" id="{62F939B6-93AF-4DB8-9C6B-D6C7DFDC589F}" vid="{4A3C46E8-61CC-4603-A589-7422A47A8E4A}"/>
+    </a:ext>
+  </a:extLst>
+</a:theme>
 </file>
</xml_diff>

<commit_message>
v0.5 of 2016 version
</commit_message>
<xml_diff>
--- a/MoLOverviewPoster2016.pptx
+++ b/MoLOverviewPoster2016.pptx
@@ -103,6 +103,9 @@
           </p15:clr>
         </p15:guide>
       </p15:sldGuideLst>
+    </p:ext>
+    <p:ext uri="{2D200454-40CA-4A62-9FC3-DE9A4176ACB9}">
+      <p15:notesGuideLst xmlns:p15="http://schemas.microsoft.com/office/powerpoint/2012/main"/>
     </p:ext>
   </p:extLst>
 </p:presentation>
@@ -3241,216 +3244,6 @@
       </p:grpSp>
       <p:sp>
         <p:nvSpPr>
-          <p:cNvPr id="162" name="Shape 248"/>
-          <p:cNvSpPr/>
-          <p:nvPr/>
-        </p:nvSpPr>
-        <p:spPr>
-          <a:xfrm flipV="1">
-            <a:off x="39371544" y="22368505"/>
-            <a:ext cx="1082680" cy="2003517"/>
-          </a:xfrm>
-          <a:prstGeom prst="line">
-            <a:avLst/>
-          </a:prstGeom>
-          <a:ln w="76200">
-            <a:solidFill/>
-            <a:headEnd type="triangle"/>
-          </a:ln>
-          <a:effectLst>
-            <a:outerShdw blurRad="38100" dist="20000" dir="5400000" rotWithShape="0">
-              <a:srgbClr val="000000">
-                <a:alpha val="38000"/>
-              </a:srgbClr>
-            </a:outerShdw>
-          </a:effectLst>
-        </p:spPr>
-        <p:txBody>
-          <a:bodyPr lIns="0" tIns="0" rIns="0" bIns="0"/>
-          <a:lstStyle/>
-          <a:p>
-            <a:pPr algn="ctr" defTabSz="457097">
-              <a:defRPr sz="1200">
-                <a:latin typeface="+mn-lt"/>
-                <a:ea typeface="+mn-ea"/>
-                <a:cs typeface="+mn-cs"/>
-                <a:sym typeface="Helvetica"/>
-              </a:defRPr>
-            </a:pPr>
-            <a:endParaRPr/>
-          </a:p>
-        </p:txBody>
-      </p:sp>
-      <p:sp>
-        <p:nvSpPr>
-          <p:cNvPr id="164" name="Shape 248"/>
-          <p:cNvSpPr/>
-          <p:nvPr/>
-        </p:nvSpPr>
-        <p:spPr>
-          <a:xfrm flipV="1">
-            <a:off x="38633377" y="21648208"/>
-            <a:ext cx="708382" cy="477290"/>
-          </a:xfrm>
-          <a:prstGeom prst="line">
-            <a:avLst/>
-          </a:prstGeom>
-          <a:ln w="76200">
-            <a:solidFill/>
-            <a:headEnd type="triangle"/>
-          </a:ln>
-          <a:effectLst>
-            <a:outerShdw blurRad="38100" dist="20000" dir="5400000" rotWithShape="0">
-              <a:srgbClr val="000000">
-                <a:alpha val="38000"/>
-              </a:srgbClr>
-            </a:outerShdw>
-          </a:effectLst>
-        </p:spPr>
-        <p:txBody>
-          <a:bodyPr lIns="0" tIns="0" rIns="0" bIns="0"/>
-          <a:lstStyle/>
-          <a:p>
-            <a:pPr algn="ctr" defTabSz="457097">
-              <a:defRPr sz="1200">
-                <a:latin typeface="+mn-lt"/>
-                <a:ea typeface="+mn-ea"/>
-                <a:cs typeface="+mn-cs"/>
-                <a:sym typeface="Helvetica"/>
-              </a:defRPr>
-            </a:pPr>
-            <a:endParaRPr/>
-          </a:p>
-        </p:txBody>
-      </p:sp>
-      <p:sp>
-        <p:nvSpPr>
-          <p:cNvPr id="165" name="Shape 248"/>
-          <p:cNvSpPr/>
-          <p:nvPr/>
-        </p:nvSpPr>
-        <p:spPr>
-          <a:xfrm flipV="1">
-            <a:off x="34014342" y="20984857"/>
-            <a:ext cx="4937769" cy="1502232"/>
-          </a:xfrm>
-          <a:prstGeom prst="line">
-            <a:avLst/>
-          </a:prstGeom>
-          <a:ln w="76200">
-            <a:solidFill/>
-            <a:headEnd type="triangle"/>
-          </a:ln>
-          <a:effectLst>
-            <a:outerShdw blurRad="38100" dist="20000" dir="5400000" rotWithShape="0">
-              <a:srgbClr val="000000">
-                <a:alpha val="38000"/>
-              </a:srgbClr>
-            </a:outerShdw>
-          </a:effectLst>
-        </p:spPr>
-        <p:txBody>
-          <a:bodyPr lIns="0" tIns="0" rIns="0" bIns="0"/>
-          <a:lstStyle/>
-          <a:p>
-            <a:pPr algn="ctr" defTabSz="457097">
-              <a:defRPr sz="1200">
-                <a:latin typeface="+mn-lt"/>
-                <a:ea typeface="+mn-ea"/>
-                <a:cs typeface="+mn-cs"/>
-                <a:sym typeface="Helvetica"/>
-              </a:defRPr>
-            </a:pPr>
-            <a:endParaRPr/>
-          </a:p>
-        </p:txBody>
-      </p:sp>
-      <p:sp>
-        <p:nvSpPr>
-          <p:cNvPr id="168" name="Shape 248"/>
-          <p:cNvSpPr/>
-          <p:nvPr/>
-        </p:nvSpPr>
-        <p:spPr>
-          <a:xfrm flipV="1">
-            <a:off x="40750534" y="22655874"/>
-            <a:ext cx="399591" cy="3991027"/>
-          </a:xfrm>
-          <a:prstGeom prst="line">
-            <a:avLst/>
-          </a:prstGeom>
-          <a:ln w="76200">
-            <a:solidFill/>
-            <a:headEnd type="triangle"/>
-          </a:ln>
-          <a:effectLst>
-            <a:outerShdw blurRad="38100" dist="20000" dir="5400000" rotWithShape="0">
-              <a:srgbClr val="000000">
-                <a:alpha val="38000"/>
-              </a:srgbClr>
-            </a:outerShdw>
-          </a:effectLst>
-        </p:spPr>
-        <p:txBody>
-          <a:bodyPr lIns="0" tIns="0" rIns="0" bIns="0"/>
-          <a:lstStyle/>
-          <a:p>
-            <a:pPr algn="ctr" defTabSz="457097">
-              <a:defRPr sz="1200">
-                <a:latin typeface="+mn-lt"/>
-                <a:ea typeface="+mn-ea"/>
-                <a:cs typeface="+mn-cs"/>
-                <a:sym typeface="Helvetica"/>
-              </a:defRPr>
-            </a:pPr>
-            <a:endParaRPr/>
-          </a:p>
-        </p:txBody>
-      </p:sp>
-      <p:sp>
-        <p:nvSpPr>
-          <p:cNvPr id="170" name="Shape 248"/>
-          <p:cNvSpPr/>
-          <p:nvPr/>
-        </p:nvSpPr>
-        <p:spPr>
-          <a:xfrm flipV="1">
-            <a:off x="36053265" y="22246681"/>
-            <a:ext cx="3909347" cy="4682396"/>
-          </a:xfrm>
-          <a:prstGeom prst="line">
-            <a:avLst/>
-          </a:prstGeom>
-          <a:ln w="76200">
-            <a:solidFill/>
-            <a:headEnd type="triangle"/>
-          </a:ln>
-          <a:effectLst>
-            <a:outerShdw blurRad="38100" dist="20000" dir="5400000" rotWithShape="0">
-              <a:srgbClr val="000000">
-                <a:alpha val="38000"/>
-              </a:srgbClr>
-            </a:outerShdw>
-          </a:effectLst>
-        </p:spPr>
-        <p:txBody>
-          <a:bodyPr lIns="0" tIns="0" rIns="0" bIns="0"/>
-          <a:lstStyle/>
-          <a:p>
-            <a:pPr algn="ctr" defTabSz="457097">
-              <a:defRPr sz="1200">
-                <a:latin typeface="+mn-lt"/>
-                <a:ea typeface="+mn-ea"/>
-                <a:cs typeface="+mn-cs"/>
-                <a:sym typeface="Helvetica"/>
-              </a:defRPr>
-            </a:pPr>
-            <a:endParaRPr/>
-          </a:p>
-        </p:txBody>
-      </p:sp>
-      <p:sp>
-        <p:nvSpPr>
           <p:cNvPr id="48" name="Shape 48"/>
           <p:cNvSpPr>
             <a:spLocks noGrp="1"/>
@@ -3973,10 +3766,10 @@
         </p:nvGrpSpPr>
         <p:grpSpPr>
           <a:xfrm>
-            <a:off x="22673961" y="18977270"/>
-            <a:ext cx="19852568" cy="10644552"/>
-            <a:chOff x="23107094" y="18881018"/>
-            <a:chExt cx="19852567" cy="10644553"/>
+            <a:off x="22673961" y="19036439"/>
+            <a:ext cx="19976646" cy="10583450"/>
+            <a:chOff x="23107094" y="18940187"/>
+            <a:chExt cx="19976645" cy="10583451"/>
           </a:xfrm>
         </p:grpSpPr>
         <p:sp>
@@ -3989,7 +3782,7 @@
           </p:nvSpPr>
           <p:spPr>
             <a:xfrm>
-              <a:off x="39577749" y="18881018"/>
+              <a:off x="39701827" y="18940187"/>
               <a:ext cx="3381912" cy="3383662"/>
             </a:xfrm>
             <a:prstGeom prst="ellipse">
@@ -4109,7 +3902,7 @@
           </p:nvSpPr>
           <p:spPr>
             <a:xfrm>
-              <a:off x="26912397" y="26633405"/>
+              <a:off x="26832124" y="26764576"/>
               <a:ext cx="2778806" cy="2427776"/>
             </a:xfrm>
             <a:prstGeom prst="roundRect">
@@ -4289,7 +4082,7 @@
           </p:nvSpPr>
           <p:spPr>
             <a:xfrm>
-              <a:off x="26912397" y="23630460"/>
+              <a:off x="26860518" y="24624515"/>
               <a:ext cx="2778806" cy="1887863"/>
             </a:xfrm>
             <a:prstGeom prst="roundRect">
@@ -4442,14 +4235,14 @@
                   <a:srgbClr val="D8C9EE"/>
                 </a:gs>
                 <a:gs pos="100000">
-                  <a:srgbClr val="F0EAF9"/>
+                  <a:srgbClr val="FFD1BB"/>
                 </a:gs>
               </a:gsLst>
-              <a:lin ang="16200000" scaled="0"/>
+              <a:lin ang="5400000" scaled="0"/>
             </a:gradFill>
             <a:ln w="9525" cap="flat">
               <a:solidFill>
-                <a:srgbClr val="7D60A0"/>
+                <a:schemeClr val="tx1"/>
               </a:solidFill>
               <a:prstDash val="solid"/>
               <a:bevel/>
@@ -4477,16 +4270,38 @@
               </a:r>
               <a:r>
                 <a:rPr lang="en-US" sz="2900" dirty="0" err="1" smtClean="0"/>
-                <a:t>MastMath</a:t>
+                <a:t>MastMath-UvA</a:t>
               </a:r>
               <a:r>
                 <a:rPr lang="en-US" sz="2900" dirty="0" smtClean="0"/>
-                <a:t>] Quantum computing </a:t>
+                <a:t>] </a:t>
+              </a:r>
+              <a:r>
+                <a:rPr lang="en-US" sz="2900" dirty="0" smtClean="0"/>
+                <a:t>Quantum computing </a:t>
               </a:r>
               <a:r>
                 <a:rPr lang="en-US" sz="2900" dirty="0"/>
-                <a:t>(dWolf)</a:t>
-              </a:r>
+                <a:t>(</a:t>
+              </a:r>
+              <a:r>
+                <a:rPr lang="en-US" sz="2900" dirty="0" err="1"/>
+                <a:t>dWolf</a:t>
+              </a:r>
+              <a:r>
+                <a:rPr lang="en-US" sz="2900" dirty="0" smtClean="0"/>
+                <a:t>)</a:t>
+              </a:r>
+            </a:p>
+            <a:p>
+              <a:pPr lvl="0" algn="ctr">
+                <a:defRPr sz="1800"/>
+              </a:pPr>
+              <a:r>
+                <a:rPr lang="en-US" sz="2900" dirty="0" smtClean="0"/>
+                <a:t>[8EC]</a:t>
+              </a:r>
+              <a:endParaRPr lang="en-US" sz="2900" dirty="0"/>
             </a:p>
           </p:txBody>
         </p:sp>
@@ -4567,7 +4382,7 @@
           </p:nvSpPr>
           <p:spPr>
             <a:xfrm>
-              <a:off x="37382564" y="24452854"/>
+              <a:off x="35292465" y="25323297"/>
               <a:ext cx="3013179" cy="1792874"/>
             </a:xfrm>
             <a:prstGeom prst="roundRect">
@@ -4636,8 +4451,8 @@
           </p:nvSpPr>
           <p:spPr>
             <a:xfrm>
-              <a:off x="33796605" y="24881719"/>
-              <a:ext cx="3013179" cy="1371571"/>
+              <a:off x="34516994" y="27673861"/>
+              <a:ext cx="3013179" cy="1630659"/>
             </a:xfrm>
             <a:prstGeom prst="roundRect">
               <a:avLst>
@@ -4842,75 +4657,6 @@
             </a:p>
           </p:txBody>
         </p:sp>
-        <p:sp>
-          <p:nvSpPr>
-            <p:cNvPr id="217" name="Shape 217"/>
-            <p:cNvSpPr/>
-            <p:nvPr/>
-          </p:nvSpPr>
-          <p:spPr>
-            <a:xfrm>
-              <a:off x="34938094" y="27316641"/>
-              <a:ext cx="3013179" cy="2208930"/>
-            </a:xfrm>
-            <a:prstGeom prst="roundRect">
-              <a:avLst>
-                <a:gd name="adj" fmla="val 16667"/>
-              </a:avLst>
-            </a:prstGeom>
-            <a:gradFill flip="none" rotWithShape="1">
-              <a:gsLst>
-                <a:gs pos="0">
-                  <a:srgbClr val="C8B2E9"/>
-                </a:gs>
-                <a:gs pos="35000">
-                  <a:srgbClr val="D8C9EE"/>
-                </a:gs>
-                <a:gs pos="100000">
-                  <a:srgbClr val="F0EAF9"/>
-                </a:gs>
-              </a:gsLst>
-              <a:lin ang="16200000" scaled="0"/>
-            </a:gradFill>
-            <a:ln w="9525" cap="flat">
-              <a:solidFill>
-                <a:srgbClr val="7D60A0"/>
-              </a:solidFill>
-              <a:prstDash val="solid"/>
-              <a:bevel/>
-            </a:ln>
-            <a:effectLst>
-              <a:outerShdw blurRad="38100" dist="20000" dir="5400000" rotWithShape="0">
-                <a:srgbClr val="000000">
-                  <a:alpha val="38000"/>
-                </a:srgbClr>
-              </a:outerShdw>
-            </a:effectLst>
-          </p:spPr>
-          <p:txBody>
-            <a:bodyPr wrap="square" lIns="0" tIns="0" rIns="0" bIns="0" numCol="1" anchor="ctr">
-              <a:noAutofit/>
-            </a:bodyPr>
-            <a:lstStyle/>
-            <a:p>
-              <a:pPr lvl="0" algn="ctr">
-                <a:defRPr sz="1800"/>
-              </a:pPr>
-              <a:r>
-                <a:rPr lang="en-US" sz="2900" dirty="0"/>
-                <a:t>[</a:t>
-              </a:r>
-              <a:r>
-                <a:rPr lang="en-US" sz="2900" dirty="0" err="1"/>
-                <a:t>MoL</a:t>
-              </a:r>
-              <a:r>
-                <a:rPr lang="en-US" sz="2900" dirty="0"/>
-                <a:t>-FNWI] Introduction to Modern Cryptography (Schaffner)</a:t>
-              </a:r>
-            </a:p>
-          </p:txBody>
-        </p:sp>
         <p:grpSp>
           <p:nvGrpSpPr>
             <p:cNvPr id="18" name="Group 17"/>
@@ -4919,10 +4665,10 @@
           </p:nvGrpSpPr>
           <p:grpSpPr>
             <a:xfrm>
-              <a:off x="35557954" y="21377532"/>
-              <a:ext cx="3243920" cy="2304682"/>
-              <a:chOff x="35643220" y="21347528"/>
-              <a:chExt cx="3243919" cy="2304682"/>
+              <a:off x="34907951" y="22364702"/>
+              <a:ext cx="3243920" cy="2306232"/>
+              <a:chOff x="34993217" y="22334698"/>
+              <a:chExt cx="3243919" cy="2306232"/>
             </a:xfrm>
           </p:grpSpPr>
           <p:sp>
@@ -4933,7 +4679,7 @@
             </p:nvSpPr>
             <p:spPr>
               <a:xfrm>
-                <a:off x="35643220" y="21642815"/>
+                <a:off x="34993217" y="22631535"/>
                 <a:ext cx="3243919" cy="2009395"/>
               </a:xfrm>
               <a:prstGeom prst="roundRect">
@@ -5008,7 +4754,7 @@
             </p:nvSpPr>
             <p:spPr>
               <a:xfrm>
-                <a:off x="36597052" y="21347528"/>
+                <a:off x="35918118" y="22334698"/>
                 <a:ext cx="1497972" cy="1204325"/>
               </a:xfrm>
               <a:prstGeom prst="rect">
@@ -5053,10 +4799,10 @@
           </p:nvGrpSpPr>
           <p:grpSpPr>
             <a:xfrm>
-              <a:off x="30976658" y="22104801"/>
-              <a:ext cx="3470816" cy="2512227"/>
-              <a:chOff x="38861986" y="28460007"/>
-              <a:chExt cx="3470816" cy="2512227"/>
+              <a:off x="38778738" y="22507527"/>
+              <a:ext cx="3470816" cy="2487779"/>
+              <a:chOff x="46664066" y="28862733"/>
+              <a:chExt cx="3470816" cy="2487779"/>
             </a:xfrm>
           </p:grpSpPr>
           <p:sp>
@@ -5067,7 +4813,7 @@
             </p:nvSpPr>
             <p:spPr>
               <a:xfrm>
-                <a:off x="38861986" y="28809107"/>
+                <a:off x="46664066" y="29187385"/>
                 <a:ext cx="3470816" cy="2163127"/>
               </a:xfrm>
               <a:prstGeom prst="roundRect">
@@ -5166,7 +4912,7 @@
             </p:nvSpPr>
             <p:spPr>
               <a:xfrm>
-                <a:off x="39918656" y="28460007"/>
+                <a:off x="47626918" y="28862733"/>
                 <a:ext cx="1497972" cy="1204325"/>
               </a:xfrm>
               <a:prstGeom prst="rect">
@@ -5220,10 +4966,10 @@
         </p:nvGrpSpPr>
         <p:grpSpPr>
           <a:xfrm>
-            <a:off x="11597914" y="10471919"/>
-            <a:ext cx="13900897" cy="9840734"/>
+            <a:off x="11597914" y="10471920"/>
+            <a:ext cx="13900897" cy="6267091"/>
             <a:chOff x="12031048" y="10375666"/>
-            <a:chExt cx="13900896" cy="9840733"/>
+            <a:chExt cx="13900896" cy="6267090"/>
           </a:xfrm>
         </p:grpSpPr>
         <p:sp>
@@ -5289,145 +5035,38 @@
                   <a:ea typeface="Calibri" charset="0"/>
                   <a:cs typeface="Calibri" charset="0"/>
                 </a:rPr>
-                <a:t>-FNWI] Logic and Conversation (Roelofsen)</a:t>
-              </a:r>
-            </a:p>
-          </p:txBody>
-        </p:sp>
-        <p:sp>
-          <p:nvSpPr>
-            <p:cNvPr id="148" name="Shape 148"/>
-            <p:cNvSpPr/>
-            <p:nvPr/>
-          </p:nvSpPr>
-          <p:spPr>
-            <a:xfrm>
-              <a:off x="20154682" y="17586755"/>
-              <a:ext cx="4465896" cy="2629644"/>
-            </a:xfrm>
-            <a:prstGeom prst="roundRect">
-              <a:avLst>
-                <a:gd name="adj" fmla="val 16667"/>
-              </a:avLst>
-            </a:prstGeom>
-            <a:gradFill flip="none" rotWithShape="1">
-              <a:gsLst>
-                <a:gs pos="0">
-                  <a:srgbClr val="C8B2E9"/>
-                </a:gs>
-                <a:gs pos="35000">
-                  <a:srgbClr val="D8C9EE"/>
-                </a:gs>
-                <a:gs pos="100000">
-                  <a:srgbClr val="F0EAF9"/>
-                </a:gs>
-              </a:gsLst>
-              <a:lin ang="16200000" scaled="0"/>
-            </a:gradFill>
-            <a:ln w="9525" cap="flat">
-              <a:solidFill>
-                <a:srgbClr val="7D60A0"/>
-              </a:solidFill>
-              <a:prstDash val="solid"/>
-              <a:bevel/>
-            </a:ln>
-            <a:effectLst>
-              <a:outerShdw blurRad="38100" dist="20000" dir="5400000" rotWithShape="0">
-                <a:srgbClr val="000000">
-                  <a:alpha val="38000"/>
-                </a:srgbClr>
-              </a:outerShdw>
-            </a:effectLst>
-          </p:spPr>
-          <p:txBody>
-            <a:bodyPr wrap="square" lIns="0" tIns="0" rIns="0" bIns="0" numCol="1" anchor="ctr">
-              <a:noAutofit/>
-            </a:bodyPr>
-            <a:lstStyle/>
-            <a:p>
-              <a:pPr lvl="0" algn="ctr">
-                <a:defRPr sz="1800"/>
-              </a:pPr>
-              <a:r>
-                <a:rPr lang="en-US" sz="2900" dirty="0"/>
-                <a:t>[</a:t>
-              </a:r>
-              <a:r>
-                <a:rPr lang="en-US" sz="2900" dirty="0" err="1"/>
-                <a:t>MoL</a:t>
-              </a:r>
-              <a:r>
-                <a:rPr lang="en-US" sz="2900" dirty="0"/>
-                <a:t>-FNWI] Semantics and Pragmatics in Bayesian Interpretation (Zeevat)</a:t>
-              </a:r>
-            </a:p>
-          </p:txBody>
-        </p:sp>
-        <p:sp>
-          <p:nvSpPr>
-            <p:cNvPr id="175" name="Shape 175"/>
-            <p:cNvSpPr/>
-            <p:nvPr/>
-          </p:nvSpPr>
-          <p:spPr>
-            <a:xfrm>
-              <a:off x="19551788" y="10807238"/>
-              <a:ext cx="3013179" cy="2078461"/>
-            </a:xfrm>
-            <a:prstGeom prst="roundRect">
-              <a:avLst>
-                <a:gd name="adj" fmla="val 16667"/>
-              </a:avLst>
-            </a:prstGeom>
-            <a:gradFill flip="none" rotWithShape="1">
-              <a:gsLst>
-                <a:gs pos="0">
-                  <a:srgbClr val="C8B2E9"/>
-                </a:gs>
-                <a:gs pos="35000">
-                  <a:srgbClr val="D8C9EE"/>
-                </a:gs>
-                <a:gs pos="100000">
-                  <a:srgbClr val="F0EAF9"/>
-                </a:gs>
-              </a:gsLst>
-              <a:lin ang="16200000" scaled="0"/>
-            </a:gradFill>
-            <a:ln w="9525" cap="flat">
-              <a:solidFill>
-                <a:srgbClr val="7D60A0"/>
-              </a:solidFill>
-              <a:prstDash val="solid"/>
-              <a:bevel/>
-            </a:ln>
-            <a:effectLst>
-              <a:outerShdw blurRad="38100" dist="20000" dir="5400000" rotWithShape="0">
-                <a:srgbClr val="000000">
-                  <a:alpha val="38000"/>
-                </a:srgbClr>
-              </a:outerShdw>
-            </a:effectLst>
-          </p:spPr>
-          <p:txBody>
-            <a:bodyPr wrap="square" lIns="0" tIns="0" rIns="0" bIns="0" numCol="1" anchor="ctr">
-              <a:noAutofit/>
-            </a:bodyPr>
-            <a:lstStyle/>
-            <a:p>
-              <a:pPr lvl="0" algn="ctr">
-                <a:defRPr sz="1800"/>
-              </a:pPr>
-              <a:r>
-                <a:rPr lang="en-US" sz="2900" dirty="0"/>
-                <a:t>[</a:t>
-              </a:r>
-              <a:r>
-                <a:rPr lang="en-US" sz="2900" dirty="0" err="1"/>
-                <a:t>MAPhil</a:t>
-              </a:r>
-              <a:r>
-                <a:rPr lang="en-US" sz="2900" dirty="0"/>
-                <a:t>] Causality and Explanation (Schulz)</a:t>
+                <a:t>-FNWI] </a:t>
+              </a:r>
+              <a:r>
+                <a:rPr lang="en-US" sz="2900" dirty="0" smtClean="0">
+                  <a:latin typeface="Calibri" charset="0"/>
+                  <a:ea typeface="Calibri" charset="0"/>
+                  <a:cs typeface="Calibri" charset="0"/>
+                </a:rPr>
+                <a:t/>
+              </a:r>
+              <a:br>
+                <a:rPr lang="en-US" sz="2900" dirty="0" smtClean="0">
+                  <a:latin typeface="Calibri" charset="0"/>
+                  <a:ea typeface="Calibri" charset="0"/>
+                  <a:cs typeface="Calibri" charset="0"/>
+                </a:rPr>
+              </a:br>
+              <a:r>
+                <a:rPr lang="en-US" sz="2900" dirty="0" smtClean="0">
+                  <a:latin typeface="Calibri" charset="0"/>
+                  <a:ea typeface="Calibri" charset="0"/>
+                  <a:cs typeface="Calibri" charset="0"/>
+                </a:rPr>
+                <a:t>Logic </a:t>
+              </a:r>
+              <a:r>
+                <a:rPr lang="en-US" sz="2900" dirty="0">
+                  <a:latin typeface="Calibri" charset="0"/>
+                  <a:ea typeface="Calibri" charset="0"/>
+                  <a:cs typeface="Calibri" charset="0"/>
+                </a:rPr>
+                <a:t>and Conversation (Roelofsen)</a:t>
               </a:r>
             </a:p>
           </p:txBody>
@@ -5587,10 +5226,10 @@
           </p:nvGrpSpPr>
           <p:grpSpPr>
             <a:xfrm>
-              <a:off x="15629091" y="10416234"/>
-              <a:ext cx="3611034" cy="2669857"/>
+              <a:off x="15629091" y="10416233"/>
+              <a:ext cx="3611034" cy="2593755"/>
               <a:chOff x="17473539" y="10282648"/>
-              <a:chExt cx="3611033" cy="2936813"/>
+              <a:chExt cx="3611033" cy="2853102"/>
             </a:xfrm>
           </p:grpSpPr>
           <p:sp>
@@ -5602,7 +5241,7 @@
             <p:spPr>
               <a:xfrm>
                 <a:off x="17570571" y="10470963"/>
-                <a:ext cx="3405438" cy="2748498"/>
+                <a:ext cx="3405438" cy="2664787"/>
               </a:xfrm>
               <a:prstGeom prst="roundRect">
                 <a:avLst>
@@ -5649,7 +5288,28 @@
                   </a:defRPr>
                 </a:pPr>
                 <a:r>
-                  <a:rPr lang="en-US" sz="2800" dirty="0">
+                  <a:rPr lang="en-US" sz="2800" dirty="0" smtClean="0">
+                    <a:solidFill>
+                      <a:srgbClr val="FFFFFF"/>
+                    </a:solidFill>
+                    <a:latin typeface="Calibri" charset="0"/>
+                    <a:ea typeface="Calibri" charset="0"/>
+                    <a:cs typeface="Calibri" charset="0"/>
+                  </a:rPr>
+                  <a:t/>
+                </a:r>
+                <a:br>
+                  <a:rPr lang="en-US" sz="2800" dirty="0" smtClean="0">
+                    <a:solidFill>
+                      <a:srgbClr val="FFFFFF"/>
+                    </a:solidFill>
+                    <a:latin typeface="Calibri" charset="0"/>
+                    <a:ea typeface="Calibri" charset="0"/>
+                    <a:cs typeface="Calibri" charset="0"/>
+                  </a:rPr>
+                </a:br>
+                <a:r>
+                  <a:rPr lang="en-US" sz="2800" dirty="0" smtClean="0">
                     <a:solidFill>
                       <a:srgbClr val="FFFFFF"/>
                     </a:solidFill>
@@ -5679,7 +5339,50 @@
                     <a:ea typeface="Calibri" charset="0"/>
                     <a:cs typeface="Calibri" charset="0"/>
                   </a:rPr>
-                  <a:t>-FGW] Meaning, Reference and Modality (Dekker)</a:t>
+                  <a:t>-FGW] </a:t>
+                </a:r>
+                <a:r>
+                  <a:rPr lang="en-US" sz="2800" dirty="0" smtClean="0">
+                    <a:solidFill>
+                      <a:srgbClr val="FFFFFF"/>
+                    </a:solidFill>
+                    <a:latin typeface="Calibri" charset="0"/>
+                    <a:ea typeface="Calibri" charset="0"/>
+                    <a:cs typeface="Calibri" charset="0"/>
+                  </a:rPr>
+                  <a:t/>
+                </a:r>
+                <a:br>
+                  <a:rPr lang="en-US" sz="2800" dirty="0" smtClean="0">
+                    <a:solidFill>
+                      <a:srgbClr val="FFFFFF"/>
+                    </a:solidFill>
+                    <a:latin typeface="Calibri" charset="0"/>
+                    <a:ea typeface="Calibri" charset="0"/>
+                    <a:cs typeface="Calibri" charset="0"/>
+                  </a:rPr>
+                </a:br>
+                <a:r>
+                  <a:rPr lang="en-US" sz="2800" dirty="0" smtClean="0">
+                    <a:solidFill>
+                      <a:srgbClr val="FFFFFF"/>
+                    </a:solidFill>
+                    <a:latin typeface="Calibri" charset="0"/>
+                    <a:ea typeface="Calibri" charset="0"/>
+                    <a:cs typeface="Calibri" charset="0"/>
+                  </a:rPr>
+                  <a:t>Meaning</a:t>
+                </a:r>
+                <a:r>
+                  <a:rPr lang="en-US" sz="2800" dirty="0">
+                    <a:solidFill>
+                      <a:srgbClr val="FFFFFF"/>
+                    </a:solidFill>
+                    <a:latin typeface="Calibri" charset="0"/>
+                    <a:ea typeface="Calibri" charset="0"/>
+                    <a:cs typeface="Calibri" charset="0"/>
+                  </a:rPr>
+                  <a:t>, Reference and Modality (Dekker)</a:t>
                 </a:r>
               </a:p>
             </p:txBody>
@@ -6498,9 +6201,9 @@
         <p:grpSpPr>
           <a:xfrm>
             <a:off x="6313868" y="424711"/>
-            <a:ext cx="20086501" cy="11383457"/>
+            <a:ext cx="20086501" cy="11495826"/>
             <a:chOff x="6747000" y="328456"/>
-            <a:chExt cx="20086501" cy="11383458"/>
+            <a:chExt cx="20086501" cy="11495827"/>
           </a:xfrm>
         </p:grpSpPr>
         <p:sp>
@@ -6749,88 +6452,6 @@
         </p:sp>
         <p:sp>
           <p:nvSpPr>
-            <p:cNvPr id="88" name="Shape 88"/>
-            <p:cNvSpPr/>
-            <p:nvPr/>
-          </p:nvSpPr>
-          <p:spPr>
-            <a:xfrm>
-              <a:off x="6791071" y="1050292"/>
-              <a:ext cx="3013179" cy="1887863"/>
-            </a:xfrm>
-            <a:prstGeom prst="roundRect">
-              <a:avLst>
-                <a:gd name="adj" fmla="val 16667"/>
-              </a:avLst>
-            </a:prstGeom>
-            <a:gradFill flip="none" rotWithShape="1">
-              <a:gsLst>
-                <a:gs pos="0">
-                  <a:srgbClr val="3F80CE"/>
-                </a:gs>
-                <a:gs pos="100000">
-                  <a:srgbClr val="A2C3FF"/>
-                </a:gs>
-              </a:gsLst>
-              <a:lin ang="16200000" scaled="0"/>
-            </a:gradFill>
-            <a:ln w="9525" cap="flat">
-              <a:solidFill>
-                <a:srgbClr val="4A7EBB"/>
-              </a:solidFill>
-              <a:prstDash val="solid"/>
-              <a:bevel/>
-            </a:ln>
-            <a:effectLst>
-              <a:outerShdw blurRad="38100" dist="23000" dir="5400000" rotWithShape="0">
-                <a:srgbClr val="000000">
-                  <a:alpha val="35000"/>
-                </a:srgbClr>
-              </a:outerShdw>
-            </a:effectLst>
-          </p:spPr>
-          <p:txBody>
-            <a:bodyPr wrap="square" lIns="0" tIns="0" rIns="0" bIns="0" numCol="1" anchor="ctr">
-              <a:noAutofit/>
-            </a:bodyPr>
-            <a:lstStyle/>
-            <a:p>
-              <a:pPr lvl="0" algn="ctr">
-                <a:defRPr sz="1800">
-                  <a:solidFill>
-                    <a:srgbClr val="000000"/>
-                  </a:solidFill>
-                </a:defRPr>
-              </a:pPr>
-              <a:r>
-                <a:rPr lang="en-US" sz="2900" dirty="0">
-                  <a:solidFill>
-                    <a:srgbClr val="FFFFFF"/>
-                  </a:solidFill>
-                </a:rPr>
-                <a:t>[</a:t>
-              </a:r>
-              <a:r>
-                <a:rPr lang="en-US" sz="2900" dirty="0" err="1">
-                  <a:solidFill>
-                    <a:srgbClr val="FFFFFF"/>
-                  </a:solidFill>
-                </a:rPr>
-                <a:t>MScPhys</a:t>
-              </a:r>
-              <a:r>
-                <a:rPr lang="en-US" sz="2900" dirty="0">
-                  <a:solidFill>
-                    <a:srgbClr val="FFFFFF"/>
-                  </a:solidFill>
-                </a:rPr>
-                <a:t>] Philosophy of Science (van Dongen)</a:t>
-              </a:r>
-            </a:p>
-          </p:txBody>
-        </p:sp>
-        <p:sp>
-          <p:nvSpPr>
             <p:cNvPr id="118" name="Shape 118"/>
             <p:cNvSpPr/>
             <p:nvPr/>
@@ -7139,15 +6760,7 @@
               </a:r>
               <a:r>
                 <a:rPr lang="en-US" sz="2900" dirty="0"/>
-                <a:t>-FGW] </a:t>
-              </a:r>
-              <a:r>
-                <a:rPr lang="en-US" sz="2900" dirty="0"/>
-                <a:t>Ethics, Ontology, Life: Wittgenstein's Later Work </a:t>
-              </a:r>
-              <a:r>
-                <a:rPr lang="en-US" sz="2900" dirty="0"/>
-                <a:t>(Stokhof)</a:t>
+                <a:t>-FGW] Ethics, Ontology, Life: Wittgenstein's Later Work (Stokhof)</a:t>
               </a:r>
             </a:p>
           </p:txBody>
@@ -7457,7 +7070,7 @@
           </p:nvSpPr>
           <p:spPr>
             <a:xfrm>
-              <a:off x="14320563" y="9282092"/>
+              <a:off x="23189591" y="9394461"/>
               <a:ext cx="3013179" cy="2429822"/>
             </a:xfrm>
             <a:prstGeom prst="roundRect">
@@ -7513,8 +7126,17 @@
               </a:r>
               <a:r>
                 <a:rPr lang="en-US" sz="2900" dirty="0"/>
-                <a:t>-FGW] Wittgenstein's Relevance: Perspectives (Stokhof)</a:t>
-              </a:r>
+                <a:t>-FGW] Advanced topics in Philosophy of Language (</a:t>
+              </a:r>
+              <a:r>
+                <a:rPr lang="en-US" sz="2900" dirty="0" err="1"/>
+                <a:t>Betti</a:t>
+              </a:r>
+              <a:r>
+                <a:rPr lang="en-US" sz="2900" dirty="0"/>
+                <a:t>)</a:t>
+              </a:r>
+              <a:endParaRPr lang="en-US" sz="2900" dirty="0"/>
             </a:p>
           </p:txBody>
         </p:sp>
@@ -7568,38 +7190,81 @@
             <a:pPr lvl="0" algn="ctr">
               <a:defRPr sz="1800"/>
             </a:pPr>
-            <a:endParaRPr lang="en-US" sz="2900" dirty="0">
-              <a:solidFill>
-                <a:srgbClr val="FFFFFF"/>
-              </a:solidFill>
-            </a:endParaRPr>
+            <a:r>
+              <a:rPr lang="en-US" sz="2900" dirty="0" smtClean="0">
+                <a:solidFill>
+                  <a:srgbClr val="FFFFFF"/>
+                </a:solidFill>
+              </a:rPr>
+              <a:t> </a:t>
+            </a:r>
           </a:p>
           <a:p>
             <a:pPr lvl="0" algn="ctr">
               <a:defRPr sz="1800"/>
             </a:pPr>
             <a:r>
+              <a:rPr lang="en-US" sz="2900" dirty="0" smtClean="0">
+                <a:solidFill>
+                  <a:srgbClr val="FFFFFF"/>
+                </a:solidFill>
+              </a:rPr>
+              <a:t>Logic</a:t>
+            </a:r>
+            <a:r>
               <a:rPr lang="en-US" sz="2900" dirty="0">
                 <a:solidFill>
                   <a:srgbClr val="FFFFFF"/>
                 </a:solidFill>
               </a:rPr>
-              <a:t>Sept-Dec: </a:t>
-            </a:r>
-            <a:br>
+              <a:t>, Language </a:t>
+            </a:r>
+            <a:r>
+              <a:rPr lang="en-US" sz="2900" dirty="0" smtClean="0">
+                <a:solidFill>
+                  <a:srgbClr val="FFFFFF"/>
+                </a:solidFill>
+              </a:rPr>
+              <a:t>and Computation </a:t>
+            </a:r>
+            <a:r>
               <a:rPr lang="en-US" sz="2900" dirty="0">
                 <a:solidFill>
                   <a:srgbClr val="FFFFFF"/>
                 </a:solidFill>
               </a:rPr>
+              <a:t>(Aloni) </a:t>
+            </a:r>
+            <a:r>
+              <a:rPr lang="en-US" sz="2900" dirty="0" smtClean="0">
+                <a:solidFill>
+                  <a:srgbClr val="FFFFFF"/>
+                </a:solidFill>
+              </a:rPr>
+              <a:t/>
+            </a:r>
+            <a:br>
+              <a:rPr lang="en-US" sz="2900" dirty="0" smtClean="0">
+                <a:solidFill>
+                  <a:srgbClr val="FFFFFF"/>
+                </a:solidFill>
+              </a:rPr>
             </a:br>
+            <a:r>
+              <a:rPr lang="en-US" sz="2900" dirty="0" smtClean="0">
+                <a:solidFill>
+                  <a:srgbClr val="FFFFFF"/>
+                </a:solidFill>
+              </a:rPr>
+              <a:t>[</a:t>
+            </a:r>
             <a:r>
               <a:rPr lang="en-US" sz="2900" dirty="0">
                 <a:solidFill>
                   <a:srgbClr val="FFFFFF"/>
                 </a:solidFill>
               </a:rPr>
-              <a:t>Logic, Language and Computation (Aloni) [3EC]</a:t>
+              <a:t>3EC]</a:t>
             </a:r>
           </a:p>
         </p:txBody>
@@ -7897,7 +7562,18 @@
               </a:r>
               <a:r>
                 <a:rPr lang="en-US" sz="2900" dirty="0"/>
-                <a:t>-FNWI] Capita </a:t>
+                <a:t>-FNWI] </a:t>
+              </a:r>
+              <a:r>
+                <a:rPr lang="en-US" sz="2900" dirty="0" smtClean="0"/>
+                <a:t/>
+              </a:r>
+              <a:br>
+                <a:rPr lang="en-US" sz="2900" dirty="0" smtClean="0"/>
+              </a:br>
+              <a:r>
+                <a:rPr lang="en-US" sz="2900" dirty="0" smtClean="0"/>
+                <a:t>Capita </a:t>
               </a:r>
               <a:r>
                 <a:rPr lang="en-US" sz="2900" dirty="0" smtClean="0"/>
@@ -8025,11 +7701,6 @@
                 </a:rPr>
                 <a:t>)</a:t>
               </a:r>
-              <a:endParaRPr lang="en-US" sz="2900" dirty="0">
-                <a:latin typeface="Calibri" charset="0"/>
-                <a:ea typeface="Calibri" charset="0"/>
-                <a:cs typeface="Calibri" charset="0"/>
-              </a:endParaRPr>
             </a:p>
           </p:txBody>
         </p:sp>
@@ -8106,7 +7777,38 @@
                     <a:srgbClr val="FFFFFF"/>
                   </a:solidFill>
                 </a:rPr>
-                <a:t>-VU] Set Theory (Hart) [8EC]</a:t>
+                <a:t>-VU] Set Theory </a:t>
+              </a:r>
+              <a:r>
+                <a:rPr lang="en-US" sz="2900" dirty="0" smtClean="0">
+                  <a:solidFill>
+                    <a:srgbClr val="FFFFFF"/>
+                  </a:solidFill>
+                </a:rPr>
+                <a:t/>
+              </a:r>
+              <a:br>
+                <a:rPr lang="en-US" sz="2900" dirty="0" smtClean="0">
+                  <a:solidFill>
+                    <a:srgbClr val="FFFFFF"/>
+                  </a:solidFill>
+                </a:rPr>
+              </a:br>
+              <a:r>
+                <a:rPr lang="en-US" sz="2900" dirty="0" smtClean="0">
+                  <a:solidFill>
+                    <a:srgbClr val="FFFFFF"/>
+                  </a:solidFill>
+                </a:rPr>
+                <a:t>(</a:t>
+              </a:r>
+              <a:r>
+                <a:rPr lang="en-US" sz="2900" dirty="0">
+                  <a:solidFill>
+                    <a:srgbClr val="FFFFFF"/>
+                  </a:solidFill>
+                </a:rPr>
+                <a:t>Hart) [8EC]</a:t>
               </a:r>
             </a:p>
           </p:txBody>
@@ -8241,144 +7943,6 @@
               <a:r>
                 <a:rPr lang="en-US" sz="2900" dirty="0"/>
                 <a:t>] Mathematical Structures in Logic (Bezhanishvili)</a:t>
-              </a:r>
-            </a:p>
-          </p:txBody>
-        </p:sp>
-        <p:sp>
-          <p:nvSpPr>
-            <p:cNvPr id="184" name="Shape 184"/>
-            <p:cNvSpPr/>
-            <p:nvPr/>
-          </p:nvSpPr>
-          <p:spPr>
-            <a:xfrm>
-              <a:off x="13215507" y="23123920"/>
-              <a:ext cx="3013179" cy="2429822"/>
-            </a:xfrm>
-            <a:prstGeom prst="roundRect">
-              <a:avLst>
-                <a:gd name="adj" fmla="val 16667"/>
-              </a:avLst>
-            </a:prstGeom>
-            <a:gradFill flip="none" rotWithShape="1">
-              <a:gsLst>
-                <a:gs pos="0">
-                  <a:srgbClr val="FFD1BB"/>
-                </a:gs>
-                <a:gs pos="35000">
-                  <a:srgbClr val="FFDECF"/>
-                </a:gs>
-                <a:gs pos="100000">
-                  <a:srgbClr val="FFF2ED"/>
-                </a:gs>
-              </a:gsLst>
-              <a:lin ang="16200000" scaled="0"/>
-            </a:gradFill>
-            <a:ln w="9525" cap="flat">
-              <a:solidFill>
-                <a:srgbClr val="F69240"/>
-              </a:solidFill>
-              <a:prstDash val="solid"/>
-              <a:bevel/>
-            </a:ln>
-            <a:effectLst>
-              <a:outerShdw blurRad="38100" dist="20000" dir="5400000" rotWithShape="0">
-                <a:srgbClr val="000000">
-                  <a:alpha val="38000"/>
-                </a:srgbClr>
-              </a:outerShdw>
-            </a:effectLst>
-          </p:spPr>
-          <p:txBody>
-            <a:bodyPr wrap="square" lIns="0" tIns="0" rIns="0" bIns="0" numCol="1" anchor="ctr">
-              <a:noAutofit/>
-            </a:bodyPr>
-            <a:lstStyle/>
-            <a:p>
-              <a:pPr lvl="0" algn="ctr">
-                <a:defRPr sz="1800"/>
-              </a:pPr>
-              <a:r>
-                <a:rPr lang="en-US" sz="2900" dirty="0"/>
-                <a:t>[</a:t>
-              </a:r>
-              <a:r>
-                <a:rPr lang="en-US" sz="2900" dirty="0" err="1"/>
-                <a:t>MoL</a:t>
-              </a:r>
-              <a:r>
-                <a:rPr lang="en-US" sz="2900" dirty="0"/>
-                <a:t>-FNWI] Studies of Mathematical and Logical Practice (Loewe)</a:t>
-              </a:r>
-            </a:p>
-          </p:txBody>
-        </p:sp>
-        <p:sp>
-          <p:nvSpPr>
-            <p:cNvPr id="190" name="Shape 190"/>
-            <p:cNvSpPr/>
-            <p:nvPr/>
-          </p:nvSpPr>
-          <p:spPr>
-            <a:xfrm>
-              <a:off x="17094429" y="23155451"/>
-              <a:ext cx="3013179" cy="2429822"/>
-            </a:xfrm>
-            <a:prstGeom prst="roundRect">
-              <a:avLst>
-                <a:gd name="adj" fmla="val 16667"/>
-              </a:avLst>
-            </a:prstGeom>
-            <a:gradFill flip="none" rotWithShape="1">
-              <a:gsLst>
-                <a:gs pos="0">
-                  <a:srgbClr val="FFD1BB"/>
-                </a:gs>
-                <a:gs pos="35000">
-                  <a:srgbClr val="FFDECF"/>
-                </a:gs>
-                <a:gs pos="100000">
-                  <a:srgbClr val="FFF2ED"/>
-                </a:gs>
-              </a:gsLst>
-              <a:lin ang="16200000" scaled="0"/>
-            </a:gradFill>
-            <a:ln w="9525" cap="flat">
-              <a:solidFill>
-                <a:srgbClr val="F69240"/>
-              </a:solidFill>
-              <a:prstDash val="solid"/>
-              <a:bevel/>
-            </a:ln>
-            <a:effectLst>
-              <a:outerShdw blurRad="38100" dist="20000" dir="5400000" rotWithShape="0">
-                <a:srgbClr val="000000">
-                  <a:alpha val="38000"/>
-                </a:srgbClr>
-              </a:outerShdw>
-            </a:effectLst>
-          </p:spPr>
-          <p:txBody>
-            <a:bodyPr wrap="square" lIns="0" tIns="0" rIns="0" bIns="0" numCol="1" anchor="ctr">
-              <a:noAutofit/>
-            </a:bodyPr>
-            <a:lstStyle/>
-            <a:p>
-              <a:pPr lvl="0" algn="ctr">
-                <a:defRPr sz="1800"/>
-              </a:pPr>
-              <a:r>
-                <a:rPr lang="en-US" sz="2900" dirty="0"/>
-                <a:t>[</a:t>
-              </a:r>
-              <a:r>
-                <a:rPr lang="en-US" sz="2900" dirty="0" err="1"/>
-                <a:t>MoL</a:t>
-              </a:r>
-              <a:r>
-                <a:rPr lang="en-US" sz="2900" dirty="0"/>
-                <a:t>-FNWI] Homotopy Type Theory (vdBerg)</a:t>
               </a:r>
             </a:p>
           </p:txBody>
@@ -8451,8 +8015,14 @@
                 <a:pPr lvl="0" algn="ctr">
                   <a:defRPr sz="1800"/>
                 </a:pPr>
+                <a:endParaRPr lang="en-US" sz="2900" dirty="0" smtClean="0"/>
+              </a:p>
+              <a:p>
+                <a:pPr lvl="0" algn="ctr">
+                  <a:defRPr sz="1800"/>
+                </a:pPr>
                 <a:r>
-                  <a:rPr lang="en-US" sz="2900" dirty="0"/>
+                  <a:rPr lang="en-US" sz="2900" dirty="0" smtClean="0"/>
                   <a:t>[</a:t>
                 </a:r>
                 <a:r>
@@ -8461,7 +8031,22 @@
                 </a:r>
                 <a:r>
                   <a:rPr lang="en-US" sz="2900" dirty="0"/>
-                  <a:t>-FNWI] Proof Theory (vdBerg)</a:t>
+                  <a:t>-FNWI] </a:t>
+                </a:r>
+                <a:r>
+                  <a:rPr lang="en-US" sz="2900" dirty="0" smtClean="0"/>
+                  <a:t/>
+                </a:r>
+                <a:br>
+                  <a:rPr lang="en-US" sz="2900" dirty="0" smtClean="0"/>
+                </a:br>
+                <a:r>
+                  <a:rPr lang="en-US" sz="2900" dirty="0" smtClean="0"/>
+                  <a:t>Proof </a:t>
+                </a:r>
+                <a:r>
+                  <a:rPr lang="en-US" sz="2900" dirty="0"/>
+                  <a:t>Theory (vdBerg)</a:t>
                 </a:r>
               </a:p>
             </p:txBody>
@@ -8566,6 +8151,14 @@
                 <a:noAutofit/>
               </a:bodyPr>
               <a:lstStyle/>
+              <a:p>
+                <a:pPr algn="ctr"/>
+                <a:endParaRPr lang="en-US" sz="2900" dirty="0" smtClean="0">
+                  <a:latin typeface="Calibri" charset="0"/>
+                  <a:ea typeface="Calibri" charset="0"/>
+                  <a:cs typeface="Calibri" charset="0"/>
+                </a:endParaRPr>
+              </a:p>
               <a:p>
                 <a:pPr algn="ctr"/>
                 <a:r>
@@ -8863,90 +8456,6 @@
           </p:txBody>
         </p:sp>
       </p:grpSp>
-      <p:sp>
-        <p:nvSpPr>
-          <p:cNvPr id="123" name="Shape 248"/>
-          <p:cNvSpPr/>
-          <p:nvPr/>
-        </p:nvSpPr>
-        <p:spPr>
-          <a:xfrm>
-            <a:off x="41749032" y="9624336"/>
-            <a:ext cx="0" cy="9040412"/>
-          </a:xfrm>
-          <a:prstGeom prst="line">
-            <a:avLst/>
-          </a:prstGeom>
-          <a:ln w="76200">
-            <a:solidFill/>
-            <a:headEnd type="triangle"/>
-          </a:ln>
-          <a:effectLst>
-            <a:outerShdw blurRad="38100" dist="20000" dir="5400000" rotWithShape="0">
-              <a:srgbClr val="000000">
-                <a:alpha val="38000"/>
-              </a:srgbClr>
-            </a:outerShdw>
-          </a:effectLst>
-        </p:spPr>
-        <p:txBody>
-          <a:bodyPr lIns="0" tIns="0" rIns="0" bIns="0"/>
-          <a:lstStyle/>
-          <a:p>
-            <a:pPr algn="ctr" defTabSz="457097">
-              <a:defRPr sz="1200">
-                <a:latin typeface="+mn-lt"/>
-                <a:ea typeface="+mn-ea"/>
-                <a:cs typeface="+mn-cs"/>
-                <a:sym typeface="Helvetica"/>
-              </a:defRPr>
-            </a:pPr>
-            <a:endParaRPr/>
-          </a:p>
-        </p:txBody>
-      </p:sp>
-      <p:sp>
-        <p:nvSpPr>
-          <p:cNvPr id="125" name="Shape 248"/>
-          <p:cNvSpPr/>
-          <p:nvPr/>
-        </p:nvSpPr>
-        <p:spPr>
-          <a:xfrm>
-            <a:off x="41100172" y="15349875"/>
-            <a:ext cx="49950" cy="3418335"/>
-          </a:xfrm>
-          <a:prstGeom prst="line">
-            <a:avLst/>
-          </a:prstGeom>
-          <a:ln w="76200">
-            <a:solidFill/>
-            <a:headEnd type="triangle"/>
-          </a:ln>
-          <a:effectLst>
-            <a:outerShdw blurRad="38100" dist="20000" dir="5400000" rotWithShape="0">
-              <a:srgbClr val="000000">
-                <a:alpha val="38000"/>
-              </a:srgbClr>
-            </a:outerShdw>
-          </a:effectLst>
-        </p:spPr>
-        <p:txBody>
-          <a:bodyPr lIns="0" tIns="0" rIns="0" bIns="0"/>
-          <a:lstStyle/>
-          <a:p>
-            <a:pPr algn="ctr" defTabSz="457097">
-              <a:defRPr sz="1200">
-                <a:latin typeface="+mn-lt"/>
-                <a:ea typeface="+mn-ea"/>
-                <a:cs typeface="+mn-cs"/>
-                <a:sym typeface="Helvetica"/>
-              </a:defRPr>
-            </a:pPr>
-            <a:endParaRPr/>
-          </a:p>
-        </p:txBody>
-      </p:sp>
       <p:grpSp>
         <p:nvGrpSpPr>
           <p:cNvPr id="24" name="Group 23"/>
@@ -8969,8 +8478,8 @@
           </p:nvSpPr>
           <p:spPr>
             <a:xfrm>
-              <a:off x="34274772" y="17158452"/>
-              <a:ext cx="3128147" cy="1887863"/>
+              <a:off x="34274398" y="16756034"/>
+              <a:ext cx="3128147" cy="2138462"/>
             </a:xfrm>
             <a:prstGeom prst="roundRect">
               <a:avLst>
@@ -9038,7 +8547,38 @@
                     <a:srgbClr val="FFFFFF"/>
                   </a:solidFill>
                 </a:rPr>
-                <a:t>] Knowledge Representation (vHarmelen)</a:t>
+                <a:t>] </a:t>
+              </a:r>
+              <a:r>
+                <a:rPr lang="en-US" sz="2900" dirty="0" smtClean="0">
+                  <a:solidFill>
+                    <a:srgbClr val="FFFFFF"/>
+                  </a:solidFill>
+                </a:rPr>
+                <a:t/>
+              </a:r>
+              <a:br>
+                <a:rPr lang="en-US" sz="2900" dirty="0" smtClean="0">
+                  <a:solidFill>
+                    <a:srgbClr val="FFFFFF"/>
+                  </a:solidFill>
+                </a:rPr>
+              </a:br>
+              <a:r>
+                <a:rPr lang="en-US" sz="2900" dirty="0" smtClean="0">
+                  <a:solidFill>
+                    <a:srgbClr val="FFFFFF"/>
+                  </a:solidFill>
+                </a:rPr>
+                <a:t>Knowledge </a:t>
+              </a:r>
+              <a:r>
+                <a:rPr lang="en-US" sz="2900" dirty="0">
+                  <a:solidFill>
+                    <a:srgbClr val="FFFFFF"/>
+                  </a:solidFill>
+                </a:rPr>
+                <a:t>Representation (vHarmelen)</a:t>
               </a:r>
             </a:p>
           </p:txBody>
@@ -9106,8 +8646,19 @@
                 <a:t>MScAI</a:t>
               </a:r>
               <a:r>
+                <a:rPr lang="en-US" sz="2900" dirty="0" smtClean="0"/>
+                <a:t>]</a:t>
+              </a:r>
+              <a:br>
+                <a:rPr lang="en-US" sz="2900" dirty="0" smtClean="0"/>
+              </a:br>
+              <a:r>
+                <a:rPr lang="en-US" sz="2900" dirty="0" smtClean="0"/>
+                <a:t>Natural </a:t>
+              </a:r>
+              <a:r>
                 <a:rPr lang="en-US" sz="2900" dirty="0"/>
-                <a:t>] Natural Language Processing 1 (Titov)</a:t>
+                <a:t>Language Processing 1 (Titov)</a:t>
               </a:r>
             </a:p>
           </p:txBody>
@@ -9451,7 +9002,22 @@
               </a:r>
               <a:r>
                 <a:rPr lang="en-US" sz="2900" dirty="0"/>
-                <a:t>] Music Cognition (Honing)</a:t>
+                <a:t>] </a:t>
+              </a:r>
+              <a:r>
+                <a:rPr lang="en-US" sz="2900" dirty="0" smtClean="0"/>
+                <a:t/>
+              </a:r>
+              <a:br>
+                <a:rPr lang="en-US" sz="2900" dirty="0" smtClean="0"/>
+              </a:br>
+              <a:r>
+                <a:rPr lang="en-US" sz="2900" dirty="0" smtClean="0"/>
+                <a:t>Music </a:t>
+              </a:r>
+              <a:r>
+                <a:rPr lang="en-US" sz="2900" dirty="0"/>
+                <a:t>Cognition (Honing)</a:t>
               </a:r>
             </a:p>
           </p:txBody>
@@ -9681,8 +9247,21 @@
               </a:r>
               <a:r>
                 <a:rPr lang="en-US" sz="2900" dirty="0"/>
-                <a:t>] Unsupervised Language Learning (Titov)</a:t>
-              </a:r>
+                <a:t>] Unsupervised Language Learning </a:t>
+              </a:r>
+              <a:r>
+                <a:rPr lang="en-US" sz="2900" dirty="0" smtClean="0"/>
+                <a:t>(</a:t>
+              </a:r>
+              <a:r>
+                <a:rPr lang="en-US" sz="2900" dirty="0" err="1" smtClean="0"/>
+                <a:t>Zuidema</a:t>
+              </a:r>
+              <a:r>
+                <a:rPr lang="en-US" sz="2900" dirty="0" smtClean="0"/>
+                <a:t>)</a:t>
+              </a:r>
+              <a:endParaRPr lang="en-US" sz="2900" dirty="0"/>
             </a:p>
           </p:txBody>
         </p:sp>
@@ -10000,12 +9579,12 @@
               <a:defRPr sz="1800"/>
             </a:pPr>
             <a:r>
-              <a:rPr lang="en-US" sz="2000" dirty="0"/>
+              <a:rPr lang="en-US" sz="2000"/>
               <a:t>   </a:t>
             </a:r>
             <a:r>
-              <a:rPr lang="en-US" sz="2000" dirty="0" smtClean="0"/>
-              <a:t>v3: </a:t>
+              <a:rPr lang="en-US" sz="2000" smtClean="0"/>
+              <a:t>v0.5: </a:t>
             </a:r>
             <a:r>
               <a:rPr lang="en-US" sz="2000" dirty="0">
@@ -10371,7 +9950,7 @@
         </p:nvSpPr>
         <p:spPr>
           <a:xfrm>
-            <a:off x="36044321" y="18536354"/>
+            <a:off x="35612112" y="19102520"/>
             <a:ext cx="3381912" cy="3383662"/>
           </a:xfrm>
           <a:prstGeom prst="ellipse">
@@ -10444,7 +10023,7 @@
         </p:nvSpPr>
         <p:spPr>
           <a:xfrm>
-            <a:off x="10305462" y="20186826"/>
+            <a:off x="17902428" y="23222216"/>
             <a:ext cx="2778806" cy="2427776"/>
           </a:xfrm>
           <a:prstGeom prst="roundRect">
@@ -10555,7 +10134,7 @@
         </p:nvSpPr>
         <p:spPr>
           <a:xfrm>
-            <a:off x="30241470" y="25032521"/>
+            <a:off x="30568187" y="24739150"/>
             <a:ext cx="2778806" cy="1887864"/>
           </a:xfrm>
           <a:prstGeom prst="roundRect">
@@ -10745,7 +10324,7 @@
         </p:nvSpPr>
         <p:spPr>
           <a:xfrm>
-            <a:off x="16552200" y="283047"/>
+            <a:off x="18867688" y="10716901"/>
             <a:ext cx="3484398" cy="2429822"/>
           </a:xfrm>
           <a:prstGeom prst="roundRect">
@@ -10966,7 +10545,183 @@
               <a:rPr lang="en-US" sz="2900" dirty="0"/>
               <a:t>and epistemology (Russo) </a:t>
             </a:r>
+          </a:p>
+        </p:txBody>
+      </p:sp>
+      <p:sp>
+        <p:nvSpPr>
+          <p:cNvPr id="138" name="Shape 211"/>
+          <p:cNvSpPr/>
+          <p:nvPr/>
+        </p:nvSpPr>
+        <p:spPr>
+          <a:xfrm>
+            <a:off x="26242283" y="22442771"/>
+            <a:ext cx="3013179" cy="2107808"/>
+          </a:xfrm>
+          <a:prstGeom prst="roundRect">
+            <a:avLst>
+              <a:gd name="adj" fmla="val 16667"/>
+            </a:avLst>
+          </a:prstGeom>
+          <a:gradFill flip="none" rotWithShape="1">
+            <a:gsLst>
+              <a:gs pos="0">
+                <a:srgbClr val="FFD1BB"/>
+              </a:gs>
+              <a:gs pos="35000">
+                <a:srgbClr val="FFDECF"/>
+              </a:gs>
+              <a:gs pos="100000">
+                <a:srgbClr val="FFF2ED"/>
+              </a:gs>
+            </a:gsLst>
+            <a:lin ang="16200000" scaled="0"/>
+          </a:gradFill>
+          <a:ln w="9525" cap="flat">
+            <a:solidFill>
+              <a:srgbClr val="F69240"/>
+            </a:solidFill>
+            <a:prstDash val="solid"/>
+            <a:bevel/>
+          </a:ln>
+          <a:effectLst>
+            <a:outerShdw blurRad="38100" dist="20000" dir="5400000" rotWithShape="0">
+              <a:srgbClr val="000000">
+                <a:alpha val="38000"/>
+              </a:srgbClr>
+            </a:outerShdw>
+          </a:effectLst>
+        </p:spPr>
+        <p:txBody>
+          <a:bodyPr wrap="square" lIns="0" tIns="0" rIns="0" bIns="0" numCol="1" anchor="ctr">
+            <a:noAutofit/>
+          </a:bodyPr>
+          <a:lstStyle/>
+          <a:p>
+            <a:pPr lvl="0" algn="ctr">
+              <a:defRPr sz="1800"/>
+            </a:pPr>
+            <a:r>
+              <a:rPr lang="en-US" sz="2900" dirty="0"/>
+              <a:t>[</a:t>
+            </a:r>
+            <a:r>
+              <a:rPr lang="en-US" sz="2900" dirty="0" err="1"/>
+              <a:t>MScCS</a:t>
+            </a:r>
+            <a:r>
+              <a:rPr lang="en-US" sz="2900" dirty="0"/>
+              <a:t>-VU] Logical Verification (</a:t>
+            </a:r>
+            <a:r>
+              <a:rPr lang="en-US" sz="2900" dirty="0" err="1"/>
+              <a:t>vRaamsdonk</a:t>
+            </a:r>
+            <a:r>
+              <a:rPr lang="en-US" sz="2900" dirty="0"/>
+              <a:t>)</a:t>
+            </a:r>
             <a:endParaRPr lang="en-US" sz="2900" dirty="0"/>
+          </a:p>
+        </p:txBody>
+      </p:sp>
+      <p:sp>
+        <p:nvSpPr>
+          <p:cNvPr id="156" name="Shape 136"/>
+          <p:cNvSpPr/>
+          <p:nvPr/>
+        </p:nvSpPr>
+        <p:spPr>
+          <a:xfrm>
+            <a:off x="13879257" y="23369687"/>
+            <a:ext cx="3013179" cy="2398291"/>
+          </a:xfrm>
+          <a:prstGeom prst="roundRect">
+            <a:avLst>
+              <a:gd name="adj" fmla="val 16667"/>
+            </a:avLst>
+          </a:prstGeom>
+          <a:gradFill flip="none" rotWithShape="1">
+            <a:gsLst>
+              <a:gs pos="0">
+                <a:schemeClr val="accent3"/>
+              </a:gs>
+              <a:gs pos="100000">
+                <a:schemeClr val="accent1">
+                  <a:lumMod val="75000"/>
+                </a:schemeClr>
+              </a:gs>
+            </a:gsLst>
+            <a:lin ang="16200000" scaled="0"/>
+          </a:gradFill>
+          <a:ln w="9525" cap="flat">
+            <a:solidFill>
+              <a:schemeClr val="tx1"/>
+            </a:solidFill>
+            <a:prstDash val="solid"/>
+            <a:bevel/>
+          </a:ln>
+          <a:effectLst>
+            <a:outerShdw blurRad="38100" dist="23000" dir="5400000" rotWithShape="0">
+              <a:srgbClr val="000000">
+                <a:alpha val="35000"/>
+              </a:srgbClr>
+            </a:outerShdw>
+          </a:effectLst>
+        </p:spPr>
+        <p:txBody>
+          <a:bodyPr wrap="square" lIns="0" tIns="0" rIns="0" bIns="0" numCol="1" anchor="ctr">
+            <a:noAutofit/>
+          </a:bodyPr>
+          <a:lstStyle/>
+          <a:p>
+            <a:pPr algn="ctr"/>
+            <a:r>
+              <a:rPr lang="en-US" sz="2900" dirty="0">
+                <a:solidFill>
+                  <a:srgbClr val="FFFFFF"/>
+                </a:solidFill>
+              </a:rPr>
+              <a:t>[</a:t>
+            </a:r>
+            <a:r>
+              <a:rPr lang="en-US" sz="2900" dirty="0" err="1">
+                <a:solidFill>
+                  <a:srgbClr val="FFFFFF"/>
+                </a:solidFill>
+              </a:rPr>
+              <a:t>MastMath</a:t>
+            </a:r>
+            <a:r>
+              <a:rPr lang="en-US" sz="2900" dirty="0">
+                <a:solidFill>
+                  <a:srgbClr val="FFFFFF"/>
+                </a:solidFill>
+              </a:rPr>
+              <a:t>] Intuitionistic Mathematics (</a:t>
+            </a:r>
+            <a:r>
+              <a:rPr lang="en-US" sz="2900" dirty="0" err="1">
+                <a:solidFill>
+                  <a:srgbClr val="FFFFFF"/>
+                </a:solidFill>
+              </a:rPr>
+              <a:t>Veldman</a:t>
+            </a:r>
+            <a:r>
+              <a:rPr lang="en-US" sz="2900" dirty="0">
+                <a:solidFill>
+                  <a:srgbClr val="FFFFFF"/>
+                </a:solidFill>
+              </a:rPr>
+              <a:t>) [8EC]</a:t>
+            </a:r>
+            <a:endParaRPr lang="en-US" sz="2900" dirty="0">
+              <a:solidFill>
+                <a:srgbClr val="FFFFFF"/>
+              </a:solidFill>
+            </a:endParaRPr>
           </a:p>
         </p:txBody>
       </p:sp>

</xml_diff>